<commit_message>
finished the functions lesson
</commit_message>
<xml_diff>
--- a/lesson_4/Functions.pptx
+++ b/lesson_4/Functions.pptx
@@ -11,15 +11,18 @@
     <p:sldId id="265" r:id="rId5"/>
     <p:sldId id="267" r:id="rId6"/>
     <p:sldId id="268" r:id="rId7"/>
-    <p:sldId id="269" r:id="rId8"/>
-    <p:sldId id="259" r:id="rId9"/>
-    <p:sldId id="270" r:id="rId10"/>
-    <p:sldId id="263" r:id="rId11"/>
-    <p:sldId id="262" r:id="rId12"/>
-    <p:sldId id="261" r:id="rId13"/>
+    <p:sldId id="271" r:id="rId8"/>
+    <p:sldId id="269" r:id="rId9"/>
+    <p:sldId id="259" r:id="rId10"/>
+    <p:sldId id="270" r:id="rId11"/>
+    <p:sldId id="263" r:id="rId12"/>
+    <p:sldId id="272" r:id="rId13"/>
     <p:sldId id="257" r:id="rId14"/>
-    <p:sldId id="260" r:id="rId15"/>
-    <p:sldId id="264" r:id="rId16"/>
+    <p:sldId id="273" r:id="rId15"/>
+    <p:sldId id="274" r:id="rId16"/>
+    <p:sldId id="275" r:id="rId17"/>
+    <p:sldId id="276" r:id="rId18"/>
+    <p:sldId id="261" r:id="rId19"/>
   </p:sldIdLst>
   <p:sldSz cx="9144000" cy="6858000" type="screen4x3"/>
   <p:notesSz cx="6858000" cy="9144000"/>
@@ -3205,6 +3208,449 @@
           <a:p>
             <a:r>
               <a:rPr lang="en-US" dirty="0" smtClean="0"/>
+              <a:t>Call Stack</a:t>
+            </a:r>
+            <a:endParaRPr lang="en-US" dirty="0"/>
+          </a:p>
+        </p:txBody>
+      </p:sp>
+      <p:sp>
+        <p:nvSpPr>
+          <p:cNvPr id="3" name="Content Placeholder 2"/>
+          <p:cNvSpPr>
+            <a:spLocks noGrp="1"/>
+          </p:cNvSpPr>
+          <p:nvPr>
+            <p:ph idx="1"/>
+          </p:nvPr>
+        </p:nvSpPr>
+        <p:spPr>
+          <a:xfrm>
+            <a:off x="457199" y="1600201"/>
+            <a:ext cx="4646975" cy="3738046"/>
+          </a:xfrm>
+        </p:spPr>
+        <p:txBody>
+          <a:bodyPr>
+            <a:normAutofit fontScale="62500" lnSpcReduction="20000"/>
+          </a:bodyPr>
+          <a:lstStyle/>
+          <a:p>
+            <a:r>
+              <a:rPr lang="en-US" dirty="0" smtClean="0"/>
+              <a:t>When you start a program, there’s only one stack frame – the one that tells us where we’re executing the main script.</a:t>
+            </a:r>
+            <a:endParaRPr lang="en-US" dirty="0" smtClean="0"/>
+          </a:p>
+          <a:p>
+            <a:r>
+              <a:rPr lang="en-US" dirty="0" smtClean="0"/>
+              <a:t>Let’s say that </a:t>
+            </a:r>
+            <a:r>
+              <a:rPr lang="en-US" dirty="0" smtClean="0"/>
+              <a:t>we call a function, like </a:t>
+            </a:r>
+            <a:r>
+              <a:rPr lang="en-US" dirty="0" err="1" smtClean="0"/>
+              <a:t>sqrt</a:t>
+            </a:r>
+            <a:r>
+              <a:rPr lang="en-US" dirty="0" smtClean="0"/>
+              <a:t>.</a:t>
+            </a:r>
+          </a:p>
+          <a:p>
+            <a:r>
+              <a:rPr lang="en-US" dirty="0" smtClean="0"/>
+              <a:t>This pushes </a:t>
+            </a:r>
+            <a:r>
+              <a:rPr lang="en-US" dirty="0" smtClean="0"/>
+              <a:t>a new frame onto the </a:t>
+            </a:r>
+            <a:r>
+              <a:rPr lang="en-US" dirty="0" smtClean="0"/>
+              <a:t>stack, that remembers where we are executin</a:t>
+            </a:r>
+            <a:r>
+              <a:rPr lang="en-US" dirty="0" smtClean="0"/>
+              <a:t>g inside the </a:t>
+            </a:r>
+            <a:r>
+              <a:rPr lang="en-US" dirty="0" err="1" smtClean="0"/>
+              <a:t>sqrt</a:t>
+            </a:r>
+            <a:r>
+              <a:rPr lang="en-US" dirty="0" smtClean="0"/>
+              <a:t> function.</a:t>
+            </a:r>
+            <a:endParaRPr lang="en-US" dirty="0" smtClean="0"/>
+          </a:p>
+          <a:p>
+            <a:r>
+              <a:rPr lang="en-US" dirty="0" smtClean="0"/>
+              <a:t>When we hit the return statement, this </a:t>
+            </a:r>
+            <a:r>
+              <a:rPr lang="en-US" dirty="0" smtClean="0"/>
+              <a:t>pops the last frame off the </a:t>
+            </a:r>
+            <a:r>
+              <a:rPr lang="en-US" dirty="0" smtClean="0"/>
+              <a:t>stack.</a:t>
+            </a:r>
+          </a:p>
+          <a:p>
+            <a:r>
+              <a:rPr lang="en-US" dirty="0" smtClean="0"/>
+              <a:t>The frame underneath tells us where we called </a:t>
+            </a:r>
+            <a:r>
+              <a:rPr lang="en-US" dirty="0" err="1" smtClean="0"/>
+              <a:t>sqrt</a:t>
+            </a:r>
+            <a:r>
+              <a:rPr lang="en-US" dirty="0" smtClean="0"/>
+              <a:t> from, so control returns there.</a:t>
+            </a:r>
+            <a:endParaRPr lang="en-US" dirty="0" smtClean="0"/>
+          </a:p>
+          <a:p>
+            <a:endParaRPr lang="en-US" dirty="0"/>
+          </a:p>
+        </p:txBody>
+      </p:sp>
+      <p:sp>
+        <p:nvSpPr>
+          <p:cNvPr id="4" name="Rectangle 3"/>
+          <p:cNvSpPr/>
+          <p:nvPr/>
+        </p:nvSpPr>
+        <p:spPr>
+          <a:xfrm>
+            <a:off x="5221785" y="1975925"/>
+            <a:ext cx="3316538" cy="751450"/>
+          </a:xfrm>
+          <a:prstGeom prst="rect">
+            <a:avLst/>
+          </a:prstGeom>
+        </p:spPr>
+        <p:style>
+          <a:lnRef idx="2">
+            <a:schemeClr val="accent1"/>
+          </a:lnRef>
+          <a:fillRef idx="1">
+            <a:schemeClr val="lt1"/>
+          </a:fillRef>
+          <a:effectRef idx="0">
+            <a:schemeClr val="accent1"/>
+          </a:effectRef>
+          <a:fontRef idx="minor">
+            <a:schemeClr val="dk1"/>
+          </a:fontRef>
+        </p:style>
+        <p:txBody>
+          <a:bodyPr rtlCol="0" anchor="ctr"/>
+          <a:lstStyle/>
+          <a:p>
+            <a:pPr algn="ctr"/>
+            <a:r>
+              <a:rPr lang="en-US" sz="2800" dirty="0" smtClean="0"/>
+              <a:t>In Main at line 25</a:t>
+            </a:r>
+            <a:endParaRPr lang="en-US" sz="2800" dirty="0"/>
+          </a:p>
+        </p:txBody>
+      </p:sp>
+      <p:sp>
+        <p:nvSpPr>
+          <p:cNvPr id="5" name="Rectangle 4"/>
+          <p:cNvSpPr/>
+          <p:nvPr/>
+        </p:nvSpPr>
+        <p:spPr>
+          <a:xfrm>
+            <a:off x="5221785" y="2750515"/>
+            <a:ext cx="3316538" cy="941575"/>
+          </a:xfrm>
+          <a:prstGeom prst="rect">
+            <a:avLst/>
+          </a:prstGeom>
+        </p:spPr>
+        <p:style>
+          <a:lnRef idx="2">
+            <a:schemeClr val="accent1"/>
+          </a:lnRef>
+          <a:fillRef idx="1">
+            <a:schemeClr val="lt1"/>
+          </a:fillRef>
+          <a:effectRef idx="0">
+            <a:schemeClr val="accent1"/>
+          </a:effectRef>
+          <a:fontRef idx="minor">
+            <a:schemeClr val="dk1"/>
+          </a:fontRef>
+        </p:style>
+        <p:txBody>
+          <a:bodyPr rtlCol="0" anchor="ctr"/>
+          <a:lstStyle/>
+          <a:p>
+            <a:pPr algn="ctr"/>
+            <a:r>
+              <a:rPr lang="en-US" sz="2800" dirty="0" smtClean="0"/>
+              <a:t>In geometric _mean at line 12</a:t>
+            </a:r>
+            <a:endParaRPr lang="en-US" sz="2800" dirty="0"/>
+          </a:p>
+        </p:txBody>
+      </p:sp>
+      <p:sp>
+        <p:nvSpPr>
+          <p:cNvPr id="6" name="Rectangle 5"/>
+          <p:cNvSpPr/>
+          <p:nvPr/>
+        </p:nvSpPr>
+        <p:spPr>
+          <a:xfrm>
+            <a:off x="1787637" y="5373178"/>
+            <a:ext cx="3316538" cy="941575"/>
+          </a:xfrm>
+          <a:prstGeom prst="rect">
+            <a:avLst/>
+          </a:prstGeom>
+        </p:spPr>
+        <p:style>
+          <a:lnRef idx="2">
+            <a:schemeClr val="accent1"/>
+          </a:lnRef>
+          <a:fillRef idx="1">
+            <a:schemeClr val="lt1"/>
+          </a:fillRef>
+          <a:effectRef idx="0">
+            <a:schemeClr val="accent1"/>
+          </a:effectRef>
+          <a:fontRef idx="minor">
+            <a:schemeClr val="dk1"/>
+          </a:fontRef>
+        </p:style>
+        <p:txBody>
+          <a:bodyPr rtlCol="0" anchor="ctr"/>
+          <a:lstStyle/>
+          <a:p>
+            <a:pPr algn="ctr"/>
+            <a:r>
+              <a:rPr lang="en-US" sz="2800" dirty="0" smtClean="0"/>
+              <a:t>In </a:t>
+            </a:r>
+            <a:r>
+              <a:rPr lang="en-US" sz="2800" dirty="0" err="1" smtClean="0"/>
+              <a:t>sqrt</a:t>
+            </a:r>
+            <a:r>
+              <a:rPr lang="en-US" sz="2800" dirty="0" smtClean="0"/>
+              <a:t> at line 8</a:t>
+            </a:r>
+            <a:endParaRPr lang="en-US" sz="2800" dirty="0"/>
+          </a:p>
+        </p:txBody>
+      </p:sp>
+      <p:cxnSp>
+        <p:nvCxnSpPr>
+          <p:cNvPr id="9" name="Curved Connector 8"/>
+          <p:cNvCxnSpPr>
+            <a:stCxn id="6" idx="3"/>
+          </p:cNvCxnSpPr>
+          <p:nvPr/>
+        </p:nvCxnSpPr>
+        <p:spPr>
+          <a:xfrm flipV="1">
+            <a:off x="5104175" y="3692090"/>
+            <a:ext cx="1434814" cy="2151876"/>
+          </a:xfrm>
+          <a:prstGeom prst="curvedConnector2">
+            <a:avLst/>
+          </a:prstGeom>
+          <a:ln w="152400">
+            <a:tailEnd type="triangle" w="med" len="med"/>
+          </a:ln>
+        </p:spPr>
+        <p:style>
+          <a:lnRef idx="2">
+            <a:schemeClr val="accent1"/>
+          </a:lnRef>
+          <a:fillRef idx="0">
+            <a:schemeClr val="accent1"/>
+          </a:fillRef>
+          <a:effectRef idx="1">
+            <a:schemeClr val="accent1"/>
+          </a:effectRef>
+          <a:fontRef idx="minor">
+            <a:schemeClr val="tx1"/>
+          </a:fontRef>
+        </p:style>
+      </p:cxnSp>
+      <p:sp>
+        <p:nvSpPr>
+          <p:cNvPr id="12" name="TextBox 11"/>
+          <p:cNvSpPr txBox="1"/>
+          <p:nvPr/>
+        </p:nvSpPr>
+        <p:spPr>
+          <a:xfrm>
+            <a:off x="5151218" y="4531955"/>
+            <a:ext cx="972767" cy="954107"/>
+          </a:xfrm>
+          <a:prstGeom prst="rect">
+            <a:avLst/>
+          </a:prstGeom>
+          <a:noFill/>
+        </p:spPr>
+        <p:txBody>
+          <a:bodyPr wrap="none" rtlCol="0">
+            <a:spAutoFit/>
+          </a:bodyPr>
+          <a:lstStyle/>
+          <a:p>
+            <a:r>
+              <a:rPr lang="en-US" sz="2800" dirty="0" smtClean="0"/>
+              <a:t>Enter</a:t>
+            </a:r>
+          </a:p>
+          <a:p>
+            <a:r>
+              <a:rPr lang="en-US" sz="2800" dirty="0" err="1" smtClean="0"/>
+              <a:t>sqrt</a:t>
+            </a:r>
+            <a:endParaRPr lang="en-US" sz="2800" dirty="0"/>
+          </a:p>
+        </p:txBody>
+      </p:sp>
+      <p:cxnSp>
+        <p:nvCxnSpPr>
+          <p:cNvPr id="13" name="Curved Connector 12"/>
+          <p:cNvCxnSpPr/>
+          <p:nvPr/>
+        </p:nvCxnSpPr>
+        <p:spPr>
+          <a:xfrm rot="16200000" flipH="1">
+            <a:off x="6748653" y="3905819"/>
+            <a:ext cx="2151874" cy="1724420"/>
+          </a:xfrm>
+          <a:prstGeom prst="curvedConnector3">
+            <a:avLst>
+              <a:gd name="adj1" fmla="val 100271"/>
+            </a:avLst>
+          </a:prstGeom>
+          <a:ln w="152400">
+            <a:tailEnd type="triangle" w="med" len="med"/>
+          </a:ln>
+        </p:spPr>
+        <p:style>
+          <a:lnRef idx="2">
+            <a:schemeClr val="accent1"/>
+          </a:lnRef>
+          <a:fillRef idx="0">
+            <a:schemeClr val="accent1"/>
+          </a:fillRef>
+          <a:effectRef idx="1">
+            <a:schemeClr val="accent1"/>
+          </a:effectRef>
+          <a:fontRef idx="minor">
+            <a:schemeClr val="tx1"/>
+          </a:fontRef>
+        </p:style>
+      </p:cxnSp>
+      <p:sp>
+        <p:nvSpPr>
+          <p:cNvPr id="20" name="TextBox 19"/>
+          <p:cNvSpPr txBox="1"/>
+          <p:nvPr/>
+        </p:nvSpPr>
+        <p:spPr>
+          <a:xfrm>
+            <a:off x="7393594" y="4536656"/>
+            <a:ext cx="1027119" cy="954107"/>
+          </a:xfrm>
+          <a:prstGeom prst="rect">
+            <a:avLst/>
+          </a:prstGeom>
+          <a:noFill/>
+        </p:spPr>
+        <p:txBody>
+          <a:bodyPr wrap="none" rtlCol="0">
+            <a:spAutoFit/>
+          </a:bodyPr>
+          <a:lstStyle/>
+          <a:p>
+            <a:r>
+              <a:rPr lang="en-US" sz="2800" dirty="0" smtClean="0"/>
+              <a:t>Leave</a:t>
+            </a:r>
+          </a:p>
+          <a:p>
+            <a:r>
+              <a:rPr lang="en-US" sz="2800" dirty="0" err="1" smtClean="0"/>
+              <a:t>sqrt</a:t>
+            </a:r>
+            <a:endParaRPr lang="en-US" sz="2800" dirty="0"/>
+          </a:p>
+        </p:txBody>
+      </p:sp>
+    </p:spTree>
+    <p:extLst>
+      <p:ext uri="{BB962C8B-B14F-4D97-AF65-F5344CB8AC3E}">
+        <p14:creationId xmlns:p14="http://schemas.microsoft.com/office/powerpoint/2010/main" val="2794529890"/>
+      </p:ext>
+    </p:extLst>
+  </p:cSld>
+  <p:clrMapOvr>
+    <a:masterClrMapping/>
+  </p:clrMapOvr>
+  <p:timing>
+    <p:tnLst>
+      <p:par>
+        <p:cTn xmlns:p14="http://schemas.microsoft.com/office/powerpoint/2010/main" id="1" dur="indefinite" restart="never" nodeType="tmRoot"/>
+      </p:par>
+    </p:tnLst>
+  </p:timing>
+</p:sld>
+</file>
+
+<file path=ppt/slides/slide11.xml><?xml version="1.0" encoding="utf-8"?>
+<p:sld xmlns:a="http://schemas.openxmlformats.org/drawingml/2006/main" xmlns:r="http://schemas.openxmlformats.org/officeDocument/2006/relationships" xmlns:p="http://schemas.openxmlformats.org/presentationml/2006/main">
+  <p:cSld>
+    <p:spTree>
+      <p:nvGrpSpPr>
+        <p:cNvPr id="1" name=""/>
+        <p:cNvGrpSpPr/>
+        <p:nvPr/>
+      </p:nvGrpSpPr>
+      <p:grpSpPr>
+        <a:xfrm>
+          <a:off x="0" y="0"/>
+          <a:ext cx="0" cy="0"/>
+          <a:chOff x="0" y="0"/>
+          <a:chExt cx="0" cy="0"/>
+        </a:xfrm>
+      </p:grpSpPr>
+      <p:sp>
+        <p:nvSpPr>
+          <p:cNvPr id="2" name="Title 1"/>
+          <p:cNvSpPr>
+            <a:spLocks noGrp="1"/>
+          </p:cNvSpPr>
+          <p:nvPr>
+            <p:ph type="title"/>
+          </p:nvPr>
+        </p:nvSpPr>
+        <p:spPr/>
+        <p:txBody>
+          <a:bodyPr/>
+          <a:lstStyle/>
+          <a:p>
+            <a:r>
+              <a:rPr lang="en-US" dirty="0" smtClean="0"/>
               <a:t>Hint</a:t>
             </a:r>
             <a:endParaRPr lang="en-US" dirty="0"/>
@@ -3458,124 +3904,6 @@
 </p:sld>
 </file>
 
-<file path=ppt/slides/slide11.xml><?xml version="1.0" encoding="utf-8"?>
-<p:sld xmlns:a="http://schemas.openxmlformats.org/drawingml/2006/main" xmlns:r="http://schemas.openxmlformats.org/officeDocument/2006/relationships" xmlns:p="http://schemas.openxmlformats.org/presentationml/2006/main">
-  <p:cSld>
-    <p:spTree>
-      <p:nvGrpSpPr>
-        <p:cNvPr id="1" name=""/>
-        <p:cNvGrpSpPr/>
-        <p:nvPr/>
-      </p:nvGrpSpPr>
-      <p:grpSpPr>
-        <a:xfrm>
-          <a:off x="0" y="0"/>
-          <a:ext cx="0" cy="0"/>
-          <a:chOff x="0" y="0"/>
-          <a:chExt cx="0" cy="0"/>
-        </a:xfrm>
-      </p:grpSpPr>
-      <p:sp>
-        <p:nvSpPr>
-          <p:cNvPr id="2" name="Title 1"/>
-          <p:cNvSpPr>
-            <a:spLocks noGrp="1"/>
-          </p:cNvSpPr>
-          <p:nvPr>
-            <p:ph type="title"/>
-          </p:nvPr>
-        </p:nvSpPr>
-        <p:spPr/>
-        <p:txBody>
-          <a:bodyPr/>
-          <a:lstStyle/>
-          <a:p>
-            <a:r>
-              <a:rPr lang="en-US" dirty="0" smtClean="0"/>
-              <a:t>Class Exercise</a:t>
-            </a:r>
-            <a:endParaRPr lang="en-US" dirty="0"/>
-          </a:p>
-        </p:txBody>
-      </p:sp>
-      <p:sp>
-        <p:nvSpPr>
-          <p:cNvPr id="3" name="Content Placeholder 2"/>
-          <p:cNvSpPr>
-            <a:spLocks noGrp="1"/>
-          </p:cNvSpPr>
-          <p:nvPr>
-            <p:ph idx="1"/>
-          </p:nvPr>
-        </p:nvSpPr>
-        <p:spPr>
-          <a:xfrm>
-            <a:off x="457200" y="1417638"/>
-            <a:ext cx="8229600" cy="4708525"/>
-          </a:xfrm>
-        </p:spPr>
-        <p:txBody>
-          <a:bodyPr>
-            <a:normAutofit/>
-          </a:bodyPr>
-          <a:lstStyle/>
-          <a:p>
-            <a:r>
-              <a:rPr lang="en-US" dirty="0" smtClean="0"/>
-              <a:t>Write a function, </a:t>
-            </a:r>
-            <a:r>
-              <a:rPr lang="en-US" dirty="0" err="1" smtClean="0"/>
-              <a:t>sum_digits</a:t>
-            </a:r>
-            <a:r>
-              <a:rPr lang="en-US" dirty="0" smtClean="0"/>
-              <a:t> which takes an </a:t>
-            </a:r>
-            <a:r>
-              <a:rPr lang="en-US" dirty="0" err="1" smtClean="0"/>
-              <a:t>int</a:t>
-            </a:r>
-            <a:r>
-              <a:rPr lang="en-US" dirty="0" smtClean="0"/>
-              <a:t> and returns the sum of its digits.</a:t>
-            </a:r>
-          </a:p>
-          <a:p>
-            <a:r>
-              <a:rPr lang="en-US" dirty="0" smtClean="0"/>
-              <a:t>Prompt the user for their phone number, x.  Compute x minus the sum of the digits of x.</a:t>
-            </a:r>
-          </a:p>
-          <a:p>
-            <a:r>
-              <a:rPr lang="en-US" dirty="0" smtClean="0"/>
-              <a:t>If the result has more than one digit, replace it by the sum of the digits of the result.  Do this repeatedly until the result has just one digit, then display it.</a:t>
-            </a:r>
-            <a:endParaRPr lang="en-US" dirty="0"/>
-          </a:p>
-        </p:txBody>
-      </p:sp>
-    </p:spTree>
-    <p:extLst>
-      <p:ext uri="{BB962C8B-B14F-4D97-AF65-F5344CB8AC3E}">
-        <p14:creationId xmlns:p14="http://schemas.microsoft.com/office/powerpoint/2010/main" val="3335793312"/>
-      </p:ext>
-    </p:extLst>
-  </p:cSld>
-  <p:clrMapOvr>
-    <a:masterClrMapping/>
-  </p:clrMapOvr>
-  <p:timing>
-    <p:tnLst>
-      <p:par>
-        <p:cTn xmlns:p14="http://schemas.microsoft.com/office/powerpoint/2010/main" id="1" dur="indefinite" restart="never" nodeType="tmRoot"/>
-      </p:par>
-    </p:tnLst>
-  </p:timing>
-</p:sld>
-</file>
-
 <file path=ppt/slides/slide12.xml><?xml version="1.0" encoding="utf-8"?>
 <p:sld xmlns:a="http://schemas.openxmlformats.org/drawingml/2006/main" xmlns:r="http://schemas.openxmlformats.org/officeDocument/2006/relationships" xmlns:p="http://schemas.openxmlformats.org/presentationml/2006/main">
   <p:cSld>
@@ -3595,24 +3923,22 @@
       </p:grpSpPr>
       <p:sp>
         <p:nvSpPr>
-          <p:cNvPr id="2" name="Title 1"/>
-          <p:cNvSpPr>
-            <a:spLocks noGrp="1"/>
-          </p:cNvSpPr>
-          <p:nvPr>
-            <p:ph type="title"/>
+          <p:cNvPr id="4" name="Title 3"/>
+          <p:cNvSpPr>
+            <a:spLocks noGrp="1"/>
+          </p:cNvSpPr>
+          <p:nvPr>
+            <p:ph type="ctrTitle"/>
           </p:nvPr>
         </p:nvSpPr>
         <p:spPr/>
         <p:txBody>
-          <a:bodyPr>
-            <a:normAutofit/>
-          </a:bodyPr>
+          <a:bodyPr/>
           <a:lstStyle/>
           <a:p>
             <a:r>
               <a:rPr lang="en-US" dirty="0" smtClean="0"/>
-              <a:t>Every Function has a Namespace</a:t>
+              <a:t>Advantages of Functions</a:t>
             </a:r>
             <a:endParaRPr lang="en-US" dirty="0"/>
           </a:p>
@@ -3620,63 +3946,37 @@
       </p:sp>
       <p:sp>
         <p:nvSpPr>
-          <p:cNvPr id="3" name="Content Placeholder 2"/>
-          <p:cNvSpPr>
-            <a:spLocks noGrp="1"/>
-          </p:cNvSpPr>
-          <p:nvPr>
-            <p:ph idx="1"/>
+          <p:cNvPr id="5" name="Subtitle 4"/>
+          <p:cNvSpPr>
+            <a:spLocks noGrp="1"/>
+          </p:cNvSpPr>
+          <p:nvPr>
+            <p:ph type="subTitle" idx="1"/>
           </p:nvPr>
         </p:nvSpPr>
         <p:spPr/>
         <p:txBody>
-          <a:bodyPr>
-            <a:normAutofit fontScale="92500" lnSpcReduction="10000"/>
-          </a:bodyPr>
+          <a:bodyPr/>
           <a:lstStyle/>
           <a:p>
             <a:r>
               <a:rPr lang="en-US" dirty="0" smtClean="0"/>
-              <a:t>Prevents function from accidentally altering variables in other parts of the program.</a:t>
-            </a:r>
-          </a:p>
-          <a:p>
-            <a:r>
-              <a:rPr lang="en-US" dirty="0" smtClean="0"/>
-              <a:t>If functions are written by different programmers, it would be a huge pain to make sure they use different names.</a:t>
-            </a:r>
-          </a:p>
-          <a:p>
-            <a:r>
-              <a:rPr lang="en-US" dirty="0" smtClean="0"/>
-              <a:t>In huge programs, we won’t run out of nice short variable names, since they can be reused.</a:t>
-            </a:r>
-          </a:p>
-          <a:p>
-            <a:r>
-              <a:rPr lang="en-US" dirty="0" smtClean="0"/>
-              <a:t>The effects of a function are limited to the parameters it takes, making it easier to understand.</a:t>
-            </a:r>
+              <a:t>(1 min Oyster)</a:t>
+            </a:r>
+            <a:endParaRPr lang="en-US" dirty="0"/>
           </a:p>
         </p:txBody>
       </p:sp>
     </p:spTree>
     <p:extLst>
       <p:ext uri="{BB962C8B-B14F-4D97-AF65-F5344CB8AC3E}">
-        <p14:creationId xmlns:p14="http://schemas.microsoft.com/office/powerpoint/2010/main" val="2865552930"/>
+        <p14:creationId xmlns:p14="http://schemas.microsoft.com/office/powerpoint/2010/main" val="2211455893"/>
       </p:ext>
     </p:extLst>
   </p:cSld>
   <p:clrMapOvr>
     <a:masterClrMapping/>
   </p:clrMapOvr>
-  <p:timing>
-    <p:tnLst>
-      <p:par>
-        <p:cTn xmlns:p14="http://schemas.microsoft.com/office/powerpoint/2010/main" id="1" dur="indefinite" restart="never" nodeType="tmRoot"/>
-      </p:par>
-    </p:tnLst>
-  </p:timing>
 </p:sld>
 </file>
 
@@ -3841,12 +4141,12 @@
       </p:grpSpPr>
       <p:sp>
         <p:nvSpPr>
-          <p:cNvPr id="2" name="Title 1"/>
-          <p:cNvSpPr>
-            <a:spLocks noGrp="1"/>
-          </p:cNvSpPr>
-          <p:nvPr>
-            <p:ph type="title"/>
+          <p:cNvPr id="4" name="Title 3"/>
+          <p:cNvSpPr>
+            <a:spLocks noGrp="1"/>
+          </p:cNvSpPr>
+          <p:nvPr>
+            <p:ph type="ctrTitle"/>
           </p:nvPr>
         </p:nvSpPr>
         <p:spPr/>
@@ -3856,7 +4156,7 @@
           <a:p>
             <a:r>
               <a:rPr lang="en-US" dirty="0" smtClean="0"/>
-              <a:t>How Python Calls a Function</a:t>
+              <a:t>Namespaces</a:t>
             </a:r>
             <a:endParaRPr lang="en-US" dirty="0"/>
           </a:p>
@@ -3864,12 +4164,12 @@
       </p:sp>
       <p:sp>
         <p:nvSpPr>
-          <p:cNvPr id="3" name="Content Placeholder 2"/>
-          <p:cNvSpPr>
-            <a:spLocks noGrp="1"/>
-          </p:cNvSpPr>
-          <p:nvPr>
-            <p:ph idx="1"/>
+          <p:cNvPr id="5" name="Subtitle 4"/>
+          <p:cNvSpPr>
+            <a:spLocks noGrp="1"/>
+          </p:cNvSpPr>
+          <p:nvPr>
+            <p:ph type="subTitle" idx="1"/>
           </p:nvPr>
         </p:nvSpPr>
         <p:spPr/>
@@ -3877,65 +4177,20 @@
           <a:bodyPr/>
           <a:lstStyle/>
           <a:p>
-            <a:pPr marL="514350" indent="-514350">
-              <a:buFont typeface="+mj-lt"/>
-              <a:buAutoNum type="arabicPeriod"/>
-            </a:pPr>
-            <a:r>
-              <a:rPr lang="en-US" dirty="0" smtClean="0"/>
-              <a:t>Create a new local namespace</a:t>
-            </a:r>
-          </a:p>
-          <a:p>
-            <a:pPr marL="514350" indent="-514350">
-              <a:buFont typeface="+mj-lt"/>
-              <a:buAutoNum type="arabicPeriod"/>
-            </a:pPr>
-            <a:r>
-              <a:rPr lang="en-US" dirty="0" smtClean="0"/>
-              <a:t>For each parameter, create a local variable and bind it to the argument</a:t>
-            </a:r>
-          </a:p>
-          <a:p>
-            <a:pPr marL="514350" indent="-514350">
-              <a:buFont typeface="+mj-lt"/>
-              <a:buAutoNum type="arabicPeriod"/>
-            </a:pPr>
-            <a:r>
-              <a:rPr lang="en-US" dirty="0" smtClean="0"/>
-              <a:t>For each assignment statement, if name is not already in the local namespace, create a new local variable.</a:t>
-            </a:r>
-          </a:p>
-          <a:p>
-            <a:pPr marL="514350" indent="-514350">
-              <a:buFont typeface="+mj-lt"/>
-              <a:buAutoNum type="arabicPeriod"/>
-            </a:pPr>
-            <a:r>
-              <a:rPr lang="en-US" dirty="0" smtClean="0"/>
-              <a:t>Execute the statements</a:t>
-            </a:r>
-            <a:endParaRPr lang="en-US" dirty="0"/>
+            <a:endParaRPr lang="en-US"/>
           </a:p>
         </p:txBody>
       </p:sp>
     </p:spTree>
     <p:extLst>
       <p:ext uri="{BB962C8B-B14F-4D97-AF65-F5344CB8AC3E}">
-        <p14:creationId xmlns:p14="http://schemas.microsoft.com/office/powerpoint/2010/main" val="3622201044"/>
+        <p14:creationId xmlns:p14="http://schemas.microsoft.com/office/powerpoint/2010/main" val="3205792037"/>
       </p:ext>
     </p:extLst>
   </p:cSld>
   <p:clrMapOvr>
     <a:masterClrMapping/>
   </p:clrMapOvr>
-  <p:timing>
-    <p:tnLst>
-      <p:par>
-        <p:cTn xmlns:p14="http://schemas.microsoft.com/office/powerpoint/2010/main" id="1" dur="indefinite" restart="never" nodeType="tmRoot"/>
-      </p:par>
-    </p:tnLst>
-  </p:timing>
 </p:sld>
 </file>
 
@@ -3973,7 +4228,7 @@
           <a:p>
             <a:r>
               <a:rPr lang="en-US" dirty="0" smtClean="0"/>
-              <a:t>Class Exercise</a:t>
+              <a:t>The Local Namespace</a:t>
             </a:r>
             <a:endParaRPr lang="en-US" dirty="0"/>
           </a:p>
@@ -3989,53 +4244,2031 @@
             <p:ph idx="1"/>
           </p:nvPr>
         </p:nvSpPr>
-        <p:spPr/>
-        <p:txBody>
-          <a:bodyPr/>
+        <p:spPr>
+          <a:xfrm>
+            <a:off x="457200" y="1600200"/>
+            <a:ext cx="8229600" cy="1714781"/>
+          </a:xfrm>
+        </p:spPr>
+        <p:txBody>
+          <a:bodyPr>
+            <a:normAutofit fontScale="92500" lnSpcReduction="20000"/>
+          </a:bodyPr>
           <a:lstStyle/>
           <a:p>
             <a:r>
               <a:rPr lang="en-US" dirty="0" smtClean="0"/>
-              <a:t>Write a function </a:t>
-            </a:r>
+              <a:t>Here’s a depiction of what happens when we call a function with one parameter.</a:t>
+            </a:r>
+          </a:p>
+          <a:p>
+            <a:r>
+              <a:rPr lang="en-US" dirty="0" smtClean="0"/>
+              <a:t>We start in the main program (so there’s one stack frame) and we create a global variable, x.</a:t>
+            </a:r>
+            <a:endParaRPr lang="en-US" dirty="0"/>
+          </a:p>
+        </p:txBody>
+      </p:sp>
+      <p:sp>
+        <p:nvSpPr>
+          <p:cNvPr id="5" name="Rectangle 4"/>
+          <p:cNvSpPr/>
+          <p:nvPr/>
+        </p:nvSpPr>
+        <p:spPr>
+          <a:xfrm>
+            <a:off x="5863101" y="4038718"/>
+            <a:ext cx="2789372" cy="2533976"/>
+          </a:xfrm>
+          <a:prstGeom prst="rect">
+            <a:avLst/>
+          </a:prstGeom>
+        </p:spPr>
+        <p:style>
+          <a:lnRef idx="1">
+            <a:schemeClr val="accent1"/>
+          </a:lnRef>
+          <a:fillRef idx="2">
+            <a:schemeClr val="accent1"/>
+          </a:fillRef>
+          <a:effectRef idx="1">
+            <a:schemeClr val="accent1"/>
+          </a:effectRef>
+          <a:fontRef idx="minor">
+            <a:schemeClr val="dk1"/>
+          </a:fontRef>
+        </p:style>
+        <p:txBody>
+          <a:bodyPr rtlCol="0" anchor="t"/>
+          <a:lstStyle/>
+          <a:p>
+            <a:r>
+              <a:rPr lang="en-US" sz="2400" dirty="0" smtClean="0"/>
+              <a:t>Object Space</a:t>
+            </a:r>
+          </a:p>
+        </p:txBody>
+      </p:sp>
+      <p:sp>
+        <p:nvSpPr>
+          <p:cNvPr id="6" name="Rectangle 5"/>
+          <p:cNvSpPr/>
+          <p:nvPr/>
+        </p:nvSpPr>
+        <p:spPr>
+          <a:xfrm>
+            <a:off x="6832060" y="4662997"/>
+            <a:ext cx="546631" cy="466175"/>
+          </a:xfrm>
+          <a:prstGeom prst="rect">
+            <a:avLst/>
+          </a:prstGeom>
+        </p:spPr>
+        <p:style>
+          <a:lnRef idx="2">
+            <a:schemeClr val="accent1"/>
+          </a:lnRef>
+          <a:fillRef idx="1">
+            <a:schemeClr val="lt1"/>
+          </a:fillRef>
+          <a:effectRef idx="0">
+            <a:schemeClr val="accent1"/>
+          </a:effectRef>
+          <a:fontRef idx="minor">
+            <a:schemeClr val="dk1"/>
+          </a:fontRef>
+        </p:style>
+        <p:txBody>
+          <a:bodyPr rtlCol="0" anchor="ctr"/>
+          <a:lstStyle/>
+          <a:p>
+            <a:pPr algn="ctr"/>
+            <a:r>
+              <a:rPr lang="en-US" sz="2000" dirty="0"/>
+              <a:t>3</a:t>
+            </a:r>
+            <a:endParaRPr lang="en-US" sz="2000" dirty="0"/>
+          </a:p>
+        </p:txBody>
+      </p:sp>
+      <p:sp>
+        <p:nvSpPr>
+          <p:cNvPr id="9" name="TextBox 8"/>
+          <p:cNvSpPr txBox="1"/>
+          <p:nvPr/>
+        </p:nvSpPr>
+        <p:spPr>
+          <a:xfrm>
+            <a:off x="7250072" y="5148136"/>
+            <a:ext cx="441146" cy="369332"/>
+          </a:xfrm>
+          <a:prstGeom prst="rect">
+            <a:avLst/>
+          </a:prstGeom>
+          <a:noFill/>
+        </p:spPr>
+        <p:txBody>
+          <a:bodyPr wrap="none" rtlCol="0">
+            <a:spAutoFit/>
+          </a:bodyPr>
+          <a:lstStyle/>
+          <a:p>
             <a:r>
               <a:rPr lang="en-US" dirty="0" err="1" smtClean="0"/>
-              <a:t>is_consonant</a:t>
-            </a:r>
-            <a:r>
-              <a:rPr lang="en-US" dirty="0" smtClean="0"/>
-              <a:t>() that takes a character and returns True if it is a consonant</a:t>
-            </a:r>
-          </a:p>
-          <a:p>
-            <a:r>
-              <a:rPr lang="en-US" dirty="0" smtClean="0"/>
-              <a:t>Use your function to create a new </a:t>
-            </a:r>
-            <a:r>
-              <a:rPr lang="en-US" dirty="0" err="1" smtClean="0"/>
-              <a:t>fuction</a:t>
-            </a:r>
-            <a:r>
-              <a:rPr lang="en-US" dirty="0" smtClean="0"/>
-              <a:t> </a:t>
-            </a:r>
-            <a:r>
-              <a:rPr lang="en-US" dirty="0" err="1" smtClean="0"/>
-              <a:t>to_piglatin</a:t>
-            </a:r>
-            <a:r>
-              <a:rPr lang="en-US" dirty="0" smtClean="0"/>
-              <a:t>() that takes a word, moves all starting consonants to the end of the word, then adds ay to the end and returns the result</a:t>
+              <a:t>int</a:t>
             </a:r>
             <a:endParaRPr lang="en-US" dirty="0"/>
+          </a:p>
+        </p:txBody>
+      </p:sp>
+      <p:cxnSp>
+        <p:nvCxnSpPr>
+          <p:cNvPr id="10" name="Elbow Connector 9"/>
+          <p:cNvCxnSpPr>
+            <a:stCxn id="6" idx="2"/>
+            <a:endCxn id="9" idx="1"/>
+          </p:cNvCxnSpPr>
+          <p:nvPr/>
+        </p:nvCxnSpPr>
+        <p:spPr>
+          <a:xfrm rot="16200000" flipH="1">
+            <a:off x="7075909" y="5158639"/>
+            <a:ext cx="203630" cy="144696"/>
+          </a:xfrm>
+          <a:prstGeom prst="bentConnector2">
+            <a:avLst/>
+          </a:prstGeom>
+        </p:spPr>
+        <p:style>
+          <a:lnRef idx="2">
+            <a:schemeClr val="accent1"/>
+          </a:lnRef>
+          <a:fillRef idx="0">
+            <a:schemeClr val="accent1"/>
+          </a:fillRef>
+          <a:effectRef idx="1">
+            <a:schemeClr val="accent1"/>
+          </a:effectRef>
+          <a:fontRef idx="minor">
+            <a:schemeClr val="tx1"/>
+          </a:fontRef>
+        </p:style>
+      </p:cxnSp>
+      <p:sp>
+        <p:nvSpPr>
+          <p:cNvPr id="18" name="Rectangle 17"/>
+          <p:cNvSpPr/>
+          <p:nvPr/>
+        </p:nvSpPr>
+        <p:spPr>
+          <a:xfrm>
+            <a:off x="777899" y="4358917"/>
+            <a:ext cx="3884531" cy="836597"/>
+          </a:xfrm>
+          <a:prstGeom prst="rect">
+            <a:avLst/>
+          </a:prstGeom>
+        </p:spPr>
+        <p:style>
+          <a:lnRef idx="1">
+            <a:schemeClr val="accent1"/>
+          </a:lnRef>
+          <a:fillRef idx="2">
+            <a:schemeClr val="accent1"/>
+          </a:fillRef>
+          <a:effectRef idx="1">
+            <a:schemeClr val="accent1"/>
+          </a:effectRef>
+          <a:fontRef idx="minor">
+            <a:schemeClr val="dk1"/>
+          </a:fontRef>
+        </p:style>
+        <p:txBody>
+          <a:bodyPr rtlCol="0" anchor="t"/>
+          <a:lstStyle/>
+          <a:p>
+            <a:r>
+              <a:rPr lang="en-US" sz="2000" dirty="0" smtClean="0"/>
+              <a:t>Global Name </a:t>
+            </a:r>
+            <a:r>
+              <a:rPr lang="en-US" sz="2000" dirty="0" smtClean="0"/>
+              <a:t>Space </a:t>
+            </a:r>
+          </a:p>
+        </p:txBody>
+      </p:sp>
+      <p:sp>
+        <p:nvSpPr>
+          <p:cNvPr id="19" name="Rectangle 18"/>
+          <p:cNvSpPr/>
+          <p:nvPr/>
+        </p:nvSpPr>
+        <p:spPr>
+          <a:xfrm>
+            <a:off x="1733541" y="4705850"/>
+            <a:ext cx="986624" cy="466175"/>
+          </a:xfrm>
+          <a:prstGeom prst="rect">
+            <a:avLst/>
+          </a:prstGeom>
+        </p:spPr>
+        <p:style>
+          <a:lnRef idx="2">
+            <a:schemeClr val="accent1"/>
+          </a:lnRef>
+          <a:fillRef idx="1">
+            <a:schemeClr val="lt1"/>
+          </a:fillRef>
+          <a:effectRef idx="0">
+            <a:schemeClr val="accent1"/>
+          </a:effectRef>
+          <a:fontRef idx="minor">
+            <a:schemeClr val="dk1"/>
+          </a:fontRef>
+        </p:style>
+        <p:txBody>
+          <a:bodyPr rtlCol="0" anchor="ctr"/>
+          <a:lstStyle/>
+          <a:p>
+            <a:pPr algn="ctr"/>
+            <a:r>
+              <a:rPr lang="en-US" sz="2000" dirty="0" smtClean="0"/>
+              <a:t>x</a:t>
+            </a:r>
+            <a:endParaRPr lang="en-US" sz="2000" dirty="0"/>
+          </a:p>
+        </p:txBody>
+      </p:sp>
+      <p:cxnSp>
+        <p:nvCxnSpPr>
+          <p:cNvPr id="22" name="Straight Arrow Connector 21"/>
+          <p:cNvCxnSpPr>
+            <a:stCxn id="19" idx="3"/>
+          </p:cNvCxnSpPr>
+          <p:nvPr/>
+        </p:nvCxnSpPr>
+        <p:spPr>
+          <a:xfrm>
+            <a:off x="2720165" y="4938938"/>
+            <a:ext cx="4111895" cy="0"/>
+          </a:xfrm>
+          <a:prstGeom prst="straightConnector1">
+            <a:avLst/>
+          </a:prstGeom>
+          <a:ln w="101600">
+            <a:solidFill>
+              <a:srgbClr val="800000"/>
+            </a:solidFill>
+            <a:tailEnd type="triangle"/>
+          </a:ln>
+        </p:spPr>
+        <p:style>
+          <a:lnRef idx="2">
+            <a:schemeClr val="accent1"/>
+          </a:lnRef>
+          <a:fillRef idx="0">
+            <a:schemeClr val="accent1"/>
+          </a:fillRef>
+          <a:effectRef idx="1">
+            <a:schemeClr val="accent1"/>
+          </a:effectRef>
+          <a:fontRef idx="minor">
+            <a:schemeClr val="tx1"/>
+          </a:fontRef>
+        </p:style>
+      </p:cxnSp>
+      <p:sp>
+        <p:nvSpPr>
+          <p:cNvPr id="31" name="Rectangle 30"/>
+          <p:cNvSpPr/>
+          <p:nvPr/>
+        </p:nvSpPr>
+        <p:spPr>
+          <a:xfrm>
+            <a:off x="457200" y="3706794"/>
+            <a:ext cx="4451639" cy="1626007"/>
+          </a:xfrm>
+          <a:prstGeom prst="rect">
+            <a:avLst/>
+          </a:prstGeom>
+          <a:noFill/>
+        </p:spPr>
+        <p:style>
+          <a:lnRef idx="1">
+            <a:schemeClr val="accent1"/>
+          </a:lnRef>
+          <a:fillRef idx="3">
+            <a:schemeClr val="accent1"/>
+          </a:fillRef>
+          <a:effectRef idx="2">
+            <a:schemeClr val="accent1"/>
+          </a:effectRef>
+          <a:fontRef idx="minor">
+            <a:schemeClr val="lt1"/>
+          </a:fontRef>
+        </p:style>
+        <p:txBody>
+          <a:bodyPr rtlCol="0" anchor="t"/>
+          <a:lstStyle/>
+          <a:p>
+            <a:r>
+              <a:rPr lang="en-US" sz="2000" dirty="0">
+                <a:solidFill>
+                  <a:schemeClr val="tx1"/>
+                </a:solidFill>
+              </a:rPr>
+              <a:t>In module()</a:t>
+            </a:r>
+          </a:p>
+          <a:p>
+            <a:r>
+              <a:rPr lang="fr-FR" sz="2000" dirty="0" smtClean="0">
+                <a:solidFill>
+                  <a:schemeClr val="tx1"/>
+                </a:solidFill>
+              </a:rPr>
+              <a:t>x = 3</a:t>
+            </a:r>
+            <a:endParaRPr lang="en-US" sz="2000" dirty="0">
+              <a:solidFill>
+                <a:schemeClr val="tx1"/>
+              </a:solidFill>
+            </a:endParaRPr>
           </a:p>
         </p:txBody>
       </p:sp>
     </p:spTree>
     <p:extLst>
       <p:ext uri="{BB962C8B-B14F-4D97-AF65-F5344CB8AC3E}">
-        <p14:creationId xmlns:p14="http://schemas.microsoft.com/office/powerpoint/2010/main" val="2595690259"/>
+        <p14:creationId xmlns:p14="http://schemas.microsoft.com/office/powerpoint/2010/main" val="3242676906"/>
+      </p:ext>
+    </p:extLst>
+  </p:cSld>
+  <p:clrMapOvr>
+    <a:masterClrMapping/>
+  </p:clrMapOvr>
+</p:sld>
+</file>
+
+<file path=ppt/slides/slide16.xml><?xml version="1.0" encoding="utf-8"?>
+<p:sld xmlns:a="http://schemas.openxmlformats.org/drawingml/2006/main" xmlns:r="http://schemas.openxmlformats.org/officeDocument/2006/relationships" xmlns:p="http://schemas.openxmlformats.org/presentationml/2006/main">
+  <p:cSld>
+    <p:spTree>
+      <p:nvGrpSpPr>
+        <p:cNvPr id="1" name=""/>
+        <p:cNvGrpSpPr/>
+        <p:nvPr/>
+      </p:nvGrpSpPr>
+      <p:grpSpPr>
+        <a:xfrm>
+          <a:off x="0" y="0"/>
+          <a:ext cx="0" cy="0"/>
+          <a:chOff x="0" y="0"/>
+          <a:chExt cx="0" cy="0"/>
+        </a:xfrm>
+      </p:grpSpPr>
+      <p:sp>
+        <p:nvSpPr>
+          <p:cNvPr id="2" name="Title 1"/>
+          <p:cNvSpPr>
+            <a:spLocks noGrp="1"/>
+          </p:cNvSpPr>
+          <p:nvPr>
+            <p:ph type="title"/>
+          </p:nvPr>
+        </p:nvSpPr>
+        <p:spPr/>
+        <p:txBody>
+          <a:bodyPr/>
+          <a:lstStyle/>
+          <a:p>
+            <a:r>
+              <a:rPr lang="en-US" dirty="0" smtClean="0"/>
+              <a:t>The Local Namespace</a:t>
+            </a:r>
+            <a:endParaRPr lang="en-US" dirty="0"/>
+          </a:p>
+        </p:txBody>
+      </p:sp>
+      <p:sp>
+        <p:nvSpPr>
+          <p:cNvPr id="3" name="Content Placeholder 2"/>
+          <p:cNvSpPr>
+            <a:spLocks noGrp="1"/>
+          </p:cNvSpPr>
+          <p:nvPr>
+            <p:ph idx="1"/>
+          </p:nvPr>
+        </p:nvSpPr>
+        <p:spPr>
+          <a:xfrm>
+            <a:off x="457200" y="1600200"/>
+            <a:ext cx="8229600" cy="2140916"/>
+          </a:xfrm>
+        </p:spPr>
+        <p:txBody>
+          <a:bodyPr>
+            <a:normAutofit fontScale="77500" lnSpcReduction="20000"/>
+          </a:bodyPr>
+          <a:lstStyle/>
+          <a:p>
+            <a:r>
+              <a:rPr lang="en-US" dirty="0" smtClean="0"/>
+              <a:t>Next, we have our function call.</a:t>
+            </a:r>
+          </a:p>
+          <a:p>
+            <a:pPr lvl="1"/>
+            <a:r>
+              <a:rPr lang="en-US" dirty="0" smtClean="0"/>
+              <a:t>The global variable x is our argument.</a:t>
+            </a:r>
+          </a:p>
+          <a:p>
+            <a:r>
+              <a:rPr lang="en-US" dirty="0" smtClean="0"/>
+              <a:t>We create a new stack frame, and a new local namespace. </a:t>
+            </a:r>
+          </a:p>
+          <a:p>
+            <a:pPr lvl="1"/>
+            <a:r>
+              <a:rPr lang="en-US" dirty="0" smtClean="0"/>
+              <a:t>Our parameter is called x, so it becomes a local variable, and we bind it to the object being passed in.</a:t>
+            </a:r>
+            <a:endParaRPr lang="en-US" dirty="0"/>
+          </a:p>
+        </p:txBody>
+      </p:sp>
+      <p:sp>
+        <p:nvSpPr>
+          <p:cNvPr id="5" name="Rectangle 4"/>
+          <p:cNvSpPr/>
+          <p:nvPr/>
+        </p:nvSpPr>
+        <p:spPr>
+          <a:xfrm>
+            <a:off x="5863101" y="3970074"/>
+            <a:ext cx="2789372" cy="2533976"/>
+          </a:xfrm>
+          <a:prstGeom prst="rect">
+            <a:avLst/>
+          </a:prstGeom>
+        </p:spPr>
+        <p:style>
+          <a:lnRef idx="1">
+            <a:schemeClr val="accent1"/>
+          </a:lnRef>
+          <a:fillRef idx="2">
+            <a:schemeClr val="accent1"/>
+          </a:fillRef>
+          <a:effectRef idx="1">
+            <a:schemeClr val="accent1"/>
+          </a:effectRef>
+          <a:fontRef idx="minor">
+            <a:schemeClr val="dk1"/>
+          </a:fontRef>
+        </p:style>
+        <p:txBody>
+          <a:bodyPr rtlCol="0" anchor="t"/>
+          <a:lstStyle/>
+          <a:p>
+            <a:r>
+              <a:rPr lang="en-US" sz="2400" dirty="0" smtClean="0"/>
+              <a:t>Object Space</a:t>
+            </a:r>
+          </a:p>
+        </p:txBody>
+      </p:sp>
+      <p:sp>
+        <p:nvSpPr>
+          <p:cNvPr id="6" name="Rectangle 5"/>
+          <p:cNvSpPr/>
+          <p:nvPr/>
+        </p:nvSpPr>
+        <p:spPr>
+          <a:xfrm>
+            <a:off x="6832060" y="4594353"/>
+            <a:ext cx="546631" cy="466175"/>
+          </a:xfrm>
+          <a:prstGeom prst="rect">
+            <a:avLst/>
+          </a:prstGeom>
+        </p:spPr>
+        <p:style>
+          <a:lnRef idx="2">
+            <a:schemeClr val="accent1"/>
+          </a:lnRef>
+          <a:fillRef idx="1">
+            <a:schemeClr val="lt1"/>
+          </a:fillRef>
+          <a:effectRef idx="0">
+            <a:schemeClr val="accent1"/>
+          </a:effectRef>
+          <a:fontRef idx="minor">
+            <a:schemeClr val="dk1"/>
+          </a:fontRef>
+        </p:style>
+        <p:txBody>
+          <a:bodyPr rtlCol="0" anchor="ctr"/>
+          <a:lstStyle/>
+          <a:p>
+            <a:pPr algn="ctr"/>
+            <a:r>
+              <a:rPr lang="en-US" sz="2000" dirty="0"/>
+              <a:t>3</a:t>
+            </a:r>
+            <a:endParaRPr lang="en-US" sz="2000" dirty="0"/>
+          </a:p>
+        </p:txBody>
+      </p:sp>
+      <p:sp>
+        <p:nvSpPr>
+          <p:cNvPr id="9" name="TextBox 8"/>
+          <p:cNvSpPr txBox="1"/>
+          <p:nvPr/>
+        </p:nvSpPr>
+        <p:spPr>
+          <a:xfrm>
+            <a:off x="7250072" y="5079492"/>
+            <a:ext cx="441146" cy="369332"/>
+          </a:xfrm>
+          <a:prstGeom prst="rect">
+            <a:avLst/>
+          </a:prstGeom>
+          <a:noFill/>
+        </p:spPr>
+        <p:txBody>
+          <a:bodyPr wrap="none" rtlCol="0">
+            <a:spAutoFit/>
+          </a:bodyPr>
+          <a:lstStyle/>
+          <a:p>
+            <a:r>
+              <a:rPr lang="en-US" dirty="0" err="1" smtClean="0"/>
+              <a:t>int</a:t>
+            </a:r>
+            <a:endParaRPr lang="en-US" dirty="0"/>
+          </a:p>
+        </p:txBody>
+      </p:sp>
+      <p:cxnSp>
+        <p:nvCxnSpPr>
+          <p:cNvPr id="10" name="Elbow Connector 9"/>
+          <p:cNvCxnSpPr>
+            <a:stCxn id="6" idx="2"/>
+            <a:endCxn id="9" idx="1"/>
+          </p:cNvCxnSpPr>
+          <p:nvPr/>
+        </p:nvCxnSpPr>
+        <p:spPr>
+          <a:xfrm rot="16200000" flipH="1">
+            <a:off x="7075909" y="5089995"/>
+            <a:ext cx="203630" cy="144696"/>
+          </a:xfrm>
+          <a:prstGeom prst="bentConnector2">
+            <a:avLst/>
+          </a:prstGeom>
+        </p:spPr>
+        <p:style>
+          <a:lnRef idx="2">
+            <a:schemeClr val="accent1"/>
+          </a:lnRef>
+          <a:fillRef idx="0">
+            <a:schemeClr val="accent1"/>
+          </a:fillRef>
+          <a:effectRef idx="1">
+            <a:schemeClr val="accent1"/>
+          </a:effectRef>
+          <a:fontRef idx="minor">
+            <a:schemeClr val="tx1"/>
+          </a:fontRef>
+        </p:style>
+      </p:cxnSp>
+      <p:sp>
+        <p:nvSpPr>
+          <p:cNvPr id="18" name="Rectangle 17"/>
+          <p:cNvSpPr/>
+          <p:nvPr/>
+        </p:nvSpPr>
+        <p:spPr>
+          <a:xfrm>
+            <a:off x="777899" y="4290273"/>
+            <a:ext cx="3884531" cy="836597"/>
+          </a:xfrm>
+          <a:prstGeom prst="rect">
+            <a:avLst/>
+          </a:prstGeom>
+        </p:spPr>
+        <p:style>
+          <a:lnRef idx="1">
+            <a:schemeClr val="accent1"/>
+          </a:lnRef>
+          <a:fillRef idx="2">
+            <a:schemeClr val="accent1"/>
+          </a:fillRef>
+          <a:effectRef idx="1">
+            <a:schemeClr val="accent1"/>
+          </a:effectRef>
+          <a:fontRef idx="minor">
+            <a:schemeClr val="dk1"/>
+          </a:fontRef>
+        </p:style>
+        <p:txBody>
+          <a:bodyPr rtlCol="0" anchor="t"/>
+          <a:lstStyle/>
+          <a:p>
+            <a:r>
+              <a:rPr lang="en-US" sz="2000" dirty="0" smtClean="0"/>
+              <a:t>Global Name </a:t>
+            </a:r>
+            <a:r>
+              <a:rPr lang="en-US" sz="2000" dirty="0" smtClean="0"/>
+              <a:t>Space </a:t>
+            </a:r>
+          </a:p>
+        </p:txBody>
+      </p:sp>
+      <p:sp>
+        <p:nvSpPr>
+          <p:cNvPr id="19" name="Rectangle 18"/>
+          <p:cNvSpPr/>
+          <p:nvPr/>
+        </p:nvSpPr>
+        <p:spPr>
+          <a:xfrm>
+            <a:off x="1733541" y="4637206"/>
+            <a:ext cx="986624" cy="466175"/>
+          </a:xfrm>
+          <a:prstGeom prst="rect">
+            <a:avLst/>
+          </a:prstGeom>
+        </p:spPr>
+        <p:style>
+          <a:lnRef idx="2">
+            <a:schemeClr val="accent1"/>
+          </a:lnRef>
+          <a:fillRef idx="1">
+            <a:schemeClr val="lt1"/>
+          </a:fillRef>
+          <a:effectRef idx="0">
+            <a:schemeClr val="accent1"/>
+          </a:effectRef>
+          <a:fontRef idx="minor">
+            <a:schemeClr val="dk1"/>
+          </a:fontRef>
+        </p:style>
+        <p:txBody>
+          <a:bodyPr rtlCol="0" anchor="ctr"/>
+          <a:lstStyle/>
+          <a:p>
+            <a:pPr algn="ctr"/>
+            <a:r>
+              <a:rPr lang="en-US" sz="2000" dirty="0" smtClean="0"/>
+              <a:t>x</a:t>
+            </a:r>
+            <a:endParaRPr lang="en-US" sz="2000" dirty="0"/>
+          </a:p>
+        </p:txBody>
+      </p:sp>
+      <p:cxnSp>
+        <p:nvCxnSpPr>
+          <p:cNvPr id="22" name="Straight Arrow Connector 21"/>
+          <p:cNvCxnSpPr>
+            <a:stCxn id="19" idx="3"/>
+          </p:cNvCxnSpPr>
+          <p:nvPr/>
+        </p:nvCxnSpPr>
+        <p:spPr>
+          <a:xfrm>
+            <a:off x="2720165" y="4870294"/>
+            <a:ext cx="4111895" cy="0"/>
+          </a:xfrm>
+          <a:prstGeom prst="straightConnector1">
+            <a:avLst/>
+          </a:prstGeom>
+          <a:ln w="101600">
+            <a:solidFill>
+              <a:srgbClr val="800000"/>
+            </a:solidFill>
+            <a:tailEnd type="triangle"/>
+          </a:ln>
+        </p:spPr>
+        <p:style>
+          <a:lnRef idx="2">
+            <a:schemeClr val="accent1"/>
+          </a:lnRef>
+          <a:fillRef idx="0">
+            <a:schemeClr val="accent1"/>
+          </a:fillRef>
+          <a:effectRef idx="1">
+            <a:schemeClr val="accent1"/>
+          </a:effectRef>
+          <a:fontRef idx="minor">
+            <a:schemeClr val="tx1"/>
+          </a:fontRef>
+        </p:style>
+      </p:cxnSp>
+      <p:sp>
+        <p:nvSpPr>
+          <p:cNvPr id="31" name="Rectangle 30"/>
+          <p:cNvSpPr/>
+          <p:nvPr/>
+        </p:nvSpPr>
+        <p:spPr>
+          <a:xfrm>
+            <a:off x="457200" y="3638150"/>
+            <a:ext cx="4451639" cy="1626007"/>
+          </a:xfrm>
+          <a:prstGeom prst="rect">
+            <a:avLst/>
+          </a:prstGeom>
+          <a:noFill/>
+        </p:spPr>
+        <p:style>
+          <a:lnRef idx="1">
+            <a:schemeClr val="accent1"/>
+          </a:lnRef>
+          <a:fillRef idx="3">
+            <a:schemeClr val="accent1"/>
+          </a:fillRef>
+          <a:effectRef idx="2">
+            <a:schemeClr val="accent1"/>
+          </a:effectRef>
+          <a:fontRef idx="minor">
+            <a:schemeClr val="lt1"/>
+          </a:fontRef>
+        </p:style>
+        <p:txBody>
+          <a:bodyPr rtlCol="0" anchor="t"/>
+          <a:lstStyle/>
+          <a:p>
+            <a:r>
+              <a:rPr lang="en-US" sz="2000" dirty="0">
+                <a:solidFill>
+                  <a:schemeClr val="tx1"/>
+                </a:solidFill>
+              </a:rPr>
+              <a:t>In module()</a:t>
+            </a:r>
+          </a:p>
+          <a:p>
+            <a:r>
+              <a:rPr lang="en-US" sz="2000" dirty="0">
+                <a:solidFill>
+                  <a:schemeClr val="tx1"/>
+                </a:solidFill>
+              </a:rPr>
+              <a:t>result = </a:t>
+            </a:r>
+            <a:r>
+              <a:rPr lang="en-US" sz="2000" dirty="0" err="1">
+                <a:solidFill>
+                  <a:schemeClr val="tx1"/>
+                </a:solidFill>
+              </a:rPr>
+              <a:t>add_one</a:t>
+            </a:r>
+            <a:r>
+              <a:rPr lang="en-US" sz="2000" dirty="0">
+                <a:solidFill>
+                  <a:schemeClr val="tx1"/>
+                </a:solidFill>
+              </a:rPr>
+              <a:t>(x)</a:t>
+            </a:r>
+            <a:endParaRPr lang="en-US" sz="2000" dirty="0">
+              <a:solidFill>
+                <a:schemeClr val="tx1"/>
+              </a:solidFill>
+            </a:endParaRPr>
+          </a:p>
+        </p:txBody>
+      </p:sp>
+      <p:sp>
+        <p:nvSpPr>
+          <p:cNvPr id="12" name="Rectangle 11"/>
+          <p:cNvSpPr/>
+          <p:nvPr/>
+        </p:nvSpPr>
+        <p:spPr>
+          <a:xfrm>
+            <a:off x="777899" y="5907904"/>
+            <a:ext cx="3884531" cy="836597"/>
+          </a:xfrm>
+          <a:prstGeom prst="rect">
+            <a:avLst/>
+          </a:prstGeom>
+        </p:spPr>
+        <p:style>
+          <a:lnRef idx="1">
+            <a:schemeClr val="accent1"/>
+          </a:lnRef>
+          <a:fillRef idx="2">
+            <a:schemeClr val="accent1"/>
+          </a:fillRef>
+          <a:effectRef idx="1">
+            <a:schemeClr val="accent1"/>
+          </a:effectRef>
+          <a:fontRef idx="minor">
+            <a:schemeClr val="dk1"/>
+          </a:fontRef>
+        </p:style>
+        <p:txBody>
+          <a:bodyPr rtlCol="0" anchor="t"/>
+          <a:lstStyle/>
+          <a:p>
+            <a:r>
+              <a:rPr lang="en-US" sz="2000" dirty="0" smtClean="0"/>
+              <a:t>Global Name </a:t>
+            </a:r>
+            <a:r>
+              <a:rPr lang="en-US" sz="2000" dirty="0" smtClean="0"/>
+              <a:t>Space </a:t>
+            </a:r>
+          </a:p>
+        </p:txBody>
+      </p:sp>
+      <p:sp>
+        <p:nvSpPr>
+          <p:cNvPr id="13" name="Rectangle 12"/>
+          <p:cNvSpPr/>
+          <p:nvPr/>
+        </p:nvSpPr>
+        <p:spPr>
+          <a:xfrm>
+            <a:off x="1733541" y="6254837"/>
+            <a:ext cx="986624" cy="466175"/>
+          </a:xfrm>
+          <a:prstGeom prst="rect">
+            <a:avLst/>
+          </a:prstGeom>
+        </p:spPr>
+        <p:style>
+          <a:lnRef idx="2">
+            <a:schemeClr val="accent1"/>
+          </a:lnRef>
+          <a:fillRef idx="1">
+            <a:schemeClr val="lt1"/>
+          </a:fillRef>
+          <a:effectRef idx="0">
+            <a:schemeClr val="accent1"/>
+          </a:effectRef>
+          <a:fontRef idx="minor">
+            <a:schemeClr val="dk1"/>
+          </a:fontRef>
+        </p:style>
+        <p:txBody>
+          <a:bodyPr rtlCol="0" anchor="ctr"/>
+          <a:lstStyle/>
+          <a:p>
+            <a:pPr algn="ctr"/>
+            <a:r>
+              <a:rPr lang="en-US" sz="2000" dirty="0" smtClean="0"/>
+              <a:t>x</a:t>
+            </a:r>
+            <a:endParaRPr lang="en-US" sz="2000" dirty="0"/>
+          </a:p>
+        </p:txBody>
+      </p:sp>
+      <p:sp>
+        <p:nvSpPr>
+          <p:cNvPr id="14" name="Rectangle 13"/>
+          <p:cNvSpPr/>
+          <p:nvPr/>
+        </p:nvSpPr>
+        <p:spPr>
+          <a:xfrm>
+            <a:off x="457200" y="5255781"/>
+            <a:ext cx="4451639" cy="1626007"/>
+          </a:xfrm>
+          <a:prstGeom prst="rect">
+            <a:avLst/>
+          </a:prstGeom>
+          <a:noFill/>
+        </p:spPr>
+        <p:style>
+          <a:lnRef idx="1">
+            <a:schemeClr val="accent1"/>
+          </a:lnRef>
+          <a:fillRef idx="3">
+            <a:schemeClr val="accent1"/>
+          </a:fillRef>
+          <a:effectRef idx="2">
+            <a:schemeClr val="accent1"/>
+          </a:effectRef>
+          <a:fontRef idx="minor">
+            <a:schemeClr val="lt1"/>
+          </a:fontRef>
+        </p:style>
+        <p:txBody>
+          <a:bodyPr rtlCol="0" anchor="t"/>
+          <a:lstStyle/>
+          <a:p>
+            <a:r>
+              <a:rPr lang="en-US" sz="2000" dirty="0">
+                <a:solidFill>
+                  <a:schemeClr val="tx1"/>
+                </a:solidFill>
+              </a:rPr>
+              <a:t>In </a:t>
+            </a:r>
+            <a:r>
+              <a:rPr lang="en-US" sz="2000" dirty="0" err="1" smtClean="0">
+                <a:solidFill>
+                  <a:schemeClr val="tx1"/>
+                </a:solidFill>
+              </a:rPr>
+              <a:t>add_one</a:t>
+            </a:r>
+            <a:r>
+              <a:rPr lang="en-US" sz="2000" dirty="0" smtClean="0">
+                <a:solidFill>
+                  <a:schemeClr val="tx1"/>
+                </a:solidFill>
+              </a:rPr>
+              <a:t>()</a:t>
+            </a:r>
+            <a:endParaRPr lang="en-US" sz="2000" dirty="0">
+              <a:solidFill>
+                <a:schemeClr val="tx1"/>
+              </a:solidFill>
+            </a:endParaRPr>
+          </a:p>
+        </p:txBody>
+      </p:sp>
+      <p:cxnSp>
+        <p:nvCxnSpPr>
+          <p:cNvPr id="15" name="Straight Arrow Connector 14"/>
+          <p:cNvCxnSpPr/>
+          <p:nvPr/>
+        </p:nvCxnSpPr>
+        <p:spPr>
+          <a:xfrm flipV="1">
+            <a:off x="2720165" y="5060527"/>
+            <a:ext cx="4111895" cy="1403695"/>
+          </a:xfrm>
+          <a:prstGeom prst="straightConnector1">
+            <a:avLst/>
+          </a:prstGeom>
+          <a:ln w="101600">
+            <a:solidFill>
+              <a:srgbClr val="800000"/>
+            </a:solidFill>
+            <a:tailEnd type="triangle"/>
+          </a:ln>
+        </p:spPr>
+        <p:style>
+          <a:lnRef idx="2">
+            <a:schemeClr val="accent1"/>
+          </a:lnRef>
+          <a:fillRef idx="0">
+            <a:schemeClr val="accent1"/>
+          </a:fillRef>
+          <a:effectRef idx="1">
+            <a:schemeClr val="accent1"/>
+          </a:effectRef>
+          <a:fontRef idx="minor">
+            <a:schemeClr val="tx1"/>
+          </a:fontRef>
+        </p:style>
+      </p:cxnSp>
+    </p:spTree>
+    <p:extLst>
+      <p:ext uri="{BB962C8B-B14F-4D97-AF65-F5344CB8AC3E}">
+        <p14:creationId xmlns:p14="http://schemas.microsoft.com/office/powerpoint/2010/main" val="1143716680"/>
+      </p:ext>
+    </p:extLst>
+  </p:cSld>
+  <p:clrMapOvr>
+    <a:masterClrMapping/>
+  </p:clrMapOvr>
+</p:sld>
+</file>
+
+<file path=ppt/slides/slide17.xml><?xml version="1.0" encoding="utf-8"?>
+<p:sld xmlns:a="http://schemas.openxmlformats.org/drawingml/2006/main" xmlns:r="http://schemas.openxmlformats.org/officeDocument/2006/relationships" xmlns:p="http://schemas.openxmlformats.org/presentationml/2006/main">
+  <p:cSld>
+    <p:spTree>
+      <p:nvGrpSpPr>
+        <p:cNvPr id="1" name=""/>
+        <p:cNvGrpSpPr/>
+        <p:nvPr/>
+      </p:nvGrpSpPr>
+      <p:grpSpPr>
+        <a:xfrm>
+          <a:off x="0" y="0"/>
+          <a:ext cx="0" cy="0"/>
+          <a:chOff x="0" y="0"/>
+          <a:chExt cx="0" cy="0"/>
+        </a:xfrm>
+      </p:grpSpPr>
+      <p:sp>
+        <p:nvSpPr>
+          <p:cNvPr id="2" name="Title 1"/>
+          <p:cNvSpPr>
+            <a:spLocks noGrp="1"/>
+          </p:cNvSpPr>
+          <p:nvPr>
+            <p:ph type="title"/>
+          </p:nvPr>
+        </p:nvSpPr>
+        <p:spPr/>
+        <p:txBody>
+          <a:bodyPr/>
+          <a:lstStyle/>
+          <a:p>
+            <a:r>
+              <a:rPr lang="en-US" dirty="0" smtClean="0"/>
+              <a:t>The Local Namespace</a:t>
+            </a:r>
+            <a:endParaRPr lang="en-US" dirty="0"/>
+          </a:p>
+        </p:txBody>
+      </p:sp>
+      <p:sp>
+        <p:nvSpPr>
+          <p:cNvPr id="3" name="Content Placeholder 2"/>
+          <p:cNvSpPr>
+            <a:spLocks noGrp="1"/>
+          </p:cNvSpPr>
+          <p:nvPr>
+            <p:ph idx="1"/>
+          </p:nvPr>
+        </p:nvSpPr>
+        <p:spPr>
+          <a:xfrm>
+            <a:off x="457200" y="1600200"/>
+            <a:ext cx="8229600" cy="2140916"/>
+          </a:xfrm>
+        </p:spPr>
+        <p:txBody>
+          <a:bodyPr>
+            <a:normAutofit fontScale="92500" lnSpcReduction="20000"/>
+          </a:bodyPr>
+          <a:lstStyle/>
+          <a:p>
+            <a:r>
+              <a:rPr lang="en-US" dirty="0" smtClean="0"/>
+              <a:t>Now we execute </a:t>
+            </a:r>
+            <a:r>
+              <a:rPr lang="fr-FR" dirty="0"/>
+              <a:t>x = x + </a:t>
+            </a:r>
+            <a:r>
+              <a:rPr lang="fr-FR" dirty="0" smtClean="0"/>
+              <a:t>1 in the </a:t>
+            </a:r>
+            <a:r>
+              <a:rPr lang="fr-FR" dirty="0" err="1" smtClean="0"/>
+              <a:t>function</a:t>
+            </a:r>
+            <a:r>
+              <a:rPr lang="fr-FR" dirty="0" smtClean="0"/>
+              <a:t>.</a:t>
+            </a:r>
+          </a:p>
+          <a:p>
+            <a:r>
+              <a:rPr lang="fr-FR" dirty="0" smtClean="0"/>
+              <a:t>This </a:t>
+            </a:r>
+            <a:r>
+              <a:rPr lang="fr-FR" dirty="0" err="1" smtClean="0"/>
+              <a:t>creates</a:t>
+            </a:r>
+            <a:r>
+              <a:rPr lang="fr-FR" dirty="0" smtClean="0"/>
+              <a:t> a new </a:t>
+            </a:r>
+            <a:r>
+              <a:rPr lang="fr-FR" dirty="0" err="1" smtClean="0"/>
+              <a:t>object</a:t>
+            </a:r>
+            <a:r>
+              <a:rPr lang="fr-FR" dirty="0" smtClean="0"/>
+              <a:t> and </a:t>
+            </a:r>
+            <a:r>
+              <a:rPr lang="fr-FR" dirty="0" err="1" smtClean="0"/>
+              <a:t>binds</a:t>
+            </a:r>
+            <a:r>
+              <a:rPr lang="fr-FR" dirty="0" smtClean="0"/>
+              <a:t> </a:t>
+            </a:r>
+            <a:r>
+              <a:rPr lang="fr-FR" dirty="0" err="1" smtClean="0"/>
+              <a:t>just</a:t>
+            </a:r>
+            <a:r>
+              <a:rPr lang="fr-FR" dirty="0" smtClean="0"/>
+              <a:t> the local variable to </a:t>
+            </a:r>
+            <a:r>
+              <a:rPr lang="fr-FR" dirty="0" err="1" smtClean="0"/>
+              <a:t>it</a:t>
+            </a:r>
+            <a:r>
+              <a:rPr lang="fr-FR" dirty="0" smtClean="0"/>
+              <a:t>.</a:t>
+            </a:r>
+          </a:p>
+          <a:p>
+            <a:r>
+              <a:rPr lang="fr-FR" dirty="0" err="1" smtClean="0"/>
+              <a:t>That’s</a:t>
+            </a:r>
+            <a:r>
+              <a:rPr lang="fr-FR" dirty="0"/>
+              <a:t> </a:t>
+            </a:r>
+            <a:r>
+              <a:rPr lang="fr-FR" dirty="0" err="1" smtClean="0"/>
+              <a:t>why</a:t>
+            </a:r>
+            <a:r>
+              <a:rPr lang="fr-FR" dirty="0" smtClean="0"/>
+              <a:t> </a:t>
+            </a:r>
+            <a:r>
+              <a:rPr lang="fr-FR" dirty="0" err="1" smtClean="0"/>
+              <a:t>we</a:t>
+            </a:r>
+            <a:r>
+              <a:rPr lang="fr-FR" dirty="0" smtClean="0"/>
+              <a:t> </a:t>
+            </a:r>
+            <a:r>
+              <a:rPr lang="fr-FR" dirty="0" err="1" smtClean="0"/>
+              <a:t>get</a:t>
+            </a:r>
+            <a:r>
+              <a:rPr lang="fr-FR" dirty="0" smtClean="0"/>
+              <a:t> </a:t>
+            </a:r>
+            <a:r>
+              <a:rPr lang="fr-FR" dirty="0" err="1" smtClean="0"/>
+              <a:t>different</a:t>
+            </a:r>
+            <a:r>
+              <a:rPr lang="fr-FR" dirty="0" smtClean="0"/>
+              <a:t> </a:t>
+            </a:r>
+            <a:r>
+              <a:rPr lang="fr-FR" dirty="0" err="1" smtClean="0"/>
+              <a:t>things</a:t>
+            </a:r>
+            <a:r>
+              <a:rPr lang="fr-FR" dirty="0" smtClean="0"/>
+              <a:t> if </a:t>
+            </a:r>
+            <a:r>
+              <a:rPr lang="fr-FR" dirty="0" err="1" smtClean="0"/>
+              <a:t>we</a:t>
+            </a:r>
+            <a:r>
+              <a:rPr lang="fr-FR" dirty="0" smtClean="0"/>
+              <a:t> </a:t>
+            </a:r>
+            <a:r>
+              <a:rPr lang="fr-FR" dirty="0" err="1" smtClean="0"/>
+              <a:t>print</a:t>
+            </a:r>
+            <a:r>
+              <a:rPr lang="fr-FR" dirty="0" smtClean="0"/>
+              <a:t> x </a:t>
+            </a:r>
+            <a:r>
+              <a:rPr lang="fr-FR" dirty="0" err="1" smtClean="0"/>
+              <a:t>inside</a:t>
+            </a:r>
+            <a:r>
+              <a:rPr lang="fr-FR" dirty="0" smtClean="0"/>
+              <a:t> the </a:t>
+            </a:r>
+            <a:r>
+              <a:rPr lang="fr-FR" dirty="0" err="1" smtClean="0"/>
+              <a:t>function</a:t>
+            </a:r>
+            <a:r>
+              <a:rPr lang="fr-FR" dirty="0" smtClean="0"/>
+              <a:t> or </a:t>
+            </a:r>
+            <a:r>
+              <a:rPr lang="fr-FR" dirty="0" err="1" smtClean="0"/>
+              <a:t>outside</a:t>
+            </a:r>
+            <a:r>
+              <a:rPr lang="fr-FR" dirty="0" smtClean="0"/>
+              <a:t> of </a:t>
+            </a:r>
+            <a:r>
+              <a:rPr lang="fr-FR" dirty="0" err="1" smtClean="0"/>
+              <a:t>it</a:t>
+            </a:r>
+            <a:r>
+              <a:rPr lang="fr-FR" dirty="0" smtClean="0"/>
+              <a:t>.</a:t>
+            </a:r>
+            <a:endParaRPr lang="en-US" dirty="0"/>
+          </a:p>
+        </p:txBody>
+      </p:sp>
+      <p:sp>
+        <p:nvSpPr>
+          <p:cNvPr id="5" name="Rectangle 4"/>
+          <p:cNvSpPr/>
+          <p:nvPr/>
+        </p:nvSpPr>
+        <p:spPr>
+          <a:xfrm>
+            <a:off x="5863101" y="3970074"/>
+            <a:ext cx="2789372" cy="2533976"/>
+          </a:xfrm>
+          <a:prstGeom prst="rect">
+            <a:avLst/>
+          </a:prstGeom>
+        </p:spPr>
+        <p:style>
+          <a:lnRef idx="1">
+            <a:schemeClr val="accent1"/>
+          </a:lnRef>
+          <a:fillRef idx="2">
+            <a:schemeClr val="accent1"/>
+          </a:fillRef>
+          <a:effectRef idx="1">
+            <a:schemeClr val="accent1"/>
+          </a:effectRef>
+          <a:fontRef idx="minor">
+            <a:schemeClr val="dk1"/>
+          </a:fontRef>
+        </p:style>
+        <p:txBody>
+          <a:bodyPr rtlCol="0" anchor="t"/>
+          <a:lstStyle/>
+          <a:p>
+            <a:r>
+              <a:rPr lang="en-US" sz="2400" dirty="0" smtClean="0"/>
+              <a:t>Object Space</a:t>
+            </a:r>
+          </a:p>
+        </p:txBody>
+      </p:sp>
+      <p:sp>
+        <p:nvSpPr>
+          <p:cNvPr id="6" name="Rectangle 5"/>
+          <p:cNvSpPr/>
+          <p:nvPr/>
+        </p:nvSpPr>
+        <p:spPr>
+          <a:xfrm>
+            <a:off x="6832060" y="4594353"/>
+            <a:ext cx="546631" cy="466175"/>
+          </a:xfrm>
+          <a:prstGeom prst="rect">
+            <a:avLst/>
+          </a:prstGeom>
+        </p:spPr>
+        <p:style>
+          <a:lnRef idx="2">
+            <a:schemeClr val="accent1"/>
+          </a:lnRef>
+          <a:fillRef idx="1">
+            <a:schemeClr val="lt1"/>
+          </a:fillRef>
+          <a:effectRef idx="0">
+            <a:schemeClr val="accent1"/>
+          </a:effectRef>
+          <a:fontRef idx="minor">
+            <a:schemeClr val="dk1"/>
+          </a:fontRef>
+        </p:style>
+        <p:txBody>
+          <a:bodyPr rtlCol="0" anchor="ctr"/>
+          <a:lstStyle/>
+          <a:p>
+            <a:pPr algn="ctr"/>
+            <a:r>
+              <a:rPr lang="en-US" sz="2000" dirty="0"/>
+              <a:t>3</a:t>
+            </a:r>
+            <a:endParaRPr lang="en-US" sz="2000" dirty="0"/>
+          </a:p>
+        </p:txBody>
+      </p:sp>
+      <p:sp>
+        <p:nvSpPr>
+          <p:cNvPr id="9" name="TextBox 8"/>
+          <p:cNvSpPr txBox="1"/>
+          <p:nvPr/>
+        </p:nvSpPr>
+        <p:spPr>
+          <a:xfrm>
+            <a:off x="7250072" y="5079492"/>
+            <a:ext cx="441146" cy="369332"/>
+          </a:xfrm>
+          <a:prstGeom prst="rect">
+            <a:avLst/>
+          </a:prstGeom>
+          <a:noFill/>
+        </p:spPr>
+        <p:txBody>
+          <a:bodyPr wrap="none" rtlCol="0">
+            <a:spAutoFit/>
+          </a:bodyPr>
+          <a:lstStyle/>
+          <a:p>
+            <a:r>
+              <a:rPr lang="en-US" dirty="0" err="1" smtClean="0"/>
+              <a:t>int</a:t>
+            </a:r>
+            <a:endParaRPr lang="en-US" dirty="0"/>
+          </a:p>
+        </p:txBody>
+      </p:sp>
+      <p:cxnSp>
+        <p:nvCxnSpPr>
+          <p:cNvPr id="10" name="Elbow Connector 9"/>
+          <p:cNvCxnSpPr>
+            <a:stCxn id="6" idx="2"/>
+            <a:endCxn id="9" idx="1"/>
+          </p:cNvCxnSpPr>
+          <p:nvPr/>
+        </p:nvCxnSpPr>
+        <p:spPr>
+          <a:xfrm rot="16200000" flipH="1">
+            <a:off x="7075909" y="5089995"/>
+            <a:ext cx="203630" cy="144696"/>
+          </a:xfrm>
+          <a:prstGeom prst="bentConnector2">
+            <a:avLst/>
+          </a:prstGeom>
+        </p:spPr>
+        <p:style>
+          <a:lnRef idx="2">
+            <a:schemeClr val="accent1"/>
+          </a:lnRef>
+          <a:fillRef idx="0">
+            <a:schemeClr val="accent1"/>
+          </a:fillRef>
+          <a:effectRef idx="1">
+            <a:schemeClr val="accent1"/>
+          </a:effectRef>
+          <a:fontRef idx="minor">
+            <a:schemeClr val="tx1"/>
+          </a:fontRef>
+        </p:style>
+      </p:cxnSp>
+      <p:sp>
+        <p:nvSpPr>
+          <p:cNvPr id="18" name="Rectangle 17"/>
+          <p:cNvSpPr/>
+          <p:nvPr/>
+        </p:nvSpPr>
+        <p:spPr>
+          <a:xfrm>
+            <a:off x="777899" y="4290273"/>
+            <a:ext cx="3884531" cy="836597"/>
+          </a:xfrm>
+          <a:prstGeom prst="rect">
+            <a:avLst/>
+          </a:prstGeom>
+        </p:spPr>
+        <p:style>
+          <a:lnRef idx="1">
+            <a:schemeClr val="accent1"/>
+          </a:lnRef>
+          <a:fillRef idx="2">
+            <a:schemeClr val="accent1"/>
+          </a:fillRef>
+          <a:effectRef idx="1">
+            <a:schemeClr val="accent1"/>
+          </a:effectRef>
+          <a:fontRef idx="minor">
+            <a:schemeClr val="dk1"/>
+          </a:fontRef>
+        </p:style>
+        <p:txBody>
+          <a:bodyPr rtlCol="0" anchor="t"/>
+          <a:lstStyle/>
+          <a:p>
+            <a:r>
+              <a:rPr lang="en-US" sz="2000" dirty="0" smtClean="0"/>
+              <a:t>Global Name </a:t>
+            </a:r>
+            <a:r>
+              <a:rPr lang="en-US" sz="2000" dirty="0" smtClean="0"/>
+              <a:t>Space </a:t>
+            </a:r>
+          </a:p>
+        </p:txBody>
+      </p:sp>
+      <p:sp>
+        <p:nvSpPr>
+          <p:cNvPr id="19" name="Rectangle 18"/>
+          <p:cNvSpPr/>
+          <p:nvPr/>
+        </p:nvSpPr>
+        <p:spPr>
+          <a:xfrm>
+            <a:off x="1733541" y="4637206"/>
+            <a:ext cx="986624" cy="466175"/>
+          </a:xfrm>
+          <a:prstGeom prst="rect">
+            <a:avLst/>
+          </a:prstGeom>
+        </p:spPr>
+        <p:style>
+          <a:lnRef idx="2">
+            <a:schemeClr val="accent1"/>
+          </a:lnRef>
+          <a:fillRef idx="1">
+            <a:schemeClr val="lt1"/>
+          </a:fillRef>
+          <a:effectRef idx="0">
+            <a:schemeClr val="accent1"/>
+          </a:effectRef>
+          <a:fontRef idx="minor">
+            <a:schemeClr val="dk1"/>
+          </a:fontRef>
+        </p:style>
+        <p:txBody>
+          <a:bodyPr rtlCol="0" anchor="ctr"/>
+          <a:lstStyle/>
+          <a:p>
+            <a:pPr algn="ctr"/>
+            <a:r>
+              <a:rPr lang="en-US" sz="2000" dirty="0" smtClean="0"/>
+              <a:t>x</a:t>
+            </a:r>
+            <a:endParaRPr lang="en-US" sz="2000" dirty="0"/>
+          </a:p>
+        </p:txBody>
+      </p:sp>
+      <p:cxnSp>
+        <p:nvCxnSpPr>
+          <p:cNvPr id="22" name="Straight Arrow Connector 21"/>
+          <p:cNvCxnSpPr>
+            <a:stCxn id="19" idx="3"/>
+          </p:cNvCxnSpPr>
+          <p:nvPr/>
+        </p:nvCxnSpPr>
+        <p:spPr>
+          <a:xfrm>
+            <a:off x="2720165" y="4870294"/>
+            <a:ext cx="4111895" cy="0"/>
+          </a:xfrm>
+          <a:prstGeom prst="straightConnector1">
+            <a:avLst/>
+          </a:prstGeom>
+          <a:ln w="101600">
+            <a:solidFill>
+              <a:srgbClr val="800000"/>
+            </a:solidFill>
+            <a:tailEnd type="triangle"/>
+          </a:ln>
+        </p:spPr>
+        <p:style>
+          <a:lnRef idx="2">
+            <a:schemeClr val="accent1"/>
+          </a:lnRef>
+          <a:fillRef idx="0">
+            <a:schemeClr val="accent1"/>
+          </a:fillRef>
+          <a:effectRef idx="1">
+            <a:schemeClr val="accent1"/>
+          </a:effectRef>
+          <a:fontRef idx="minor">
+            <a:schemeClr val="tx1"/>
+          </a:fontRef>
+        </p:style>
+      </p:cxnSp>
+      <p:sp>
+        <p:nvSpPr>
+          <p:cNvPr id="31" name="Rectangle 30"/>
+          <p:cNvSpPr/>
+          <p:nvPr/>
+        </p:nvSpPr>
+        <p:spPr>
+          <a:xfrm>
+            <a:off x="457200" y="3638150"/>
+            <a:ext cx="4451639" cy="1626007"/>
+          </a:xfrm>
+          <a:prstGeom prst="rect">
+            <a:avLst/>
+          </a:prstGeom>
+          <a:noFill/>
+        </p:spPr>
+        <p:style>
+          <a:lnRef idx="1">
+            <a:schemeClr val="accent1"/>
+          </a:lnRef>
+          <a:fillRef idx="3">
+            <a:schemeClr val="accent1"/>
+          </a:fillRef>
+          <a:effectRef idx="2">
+            <a:schemeClr val="accent1"/>
+          </a:effectRef>
+          <a:fontRef idx="minor">
+            <a:schemeClr val="lt1"/>
+          </a:fontRef>
+        </p:style>
+        <p:txBody>
+          <a:bodyPr rtlCol="0" anchor="t"/>
+          <a:lstStyle/>
+          <a:p>
+            <a:r>
+              <a:rPr lang="en-US" sz="2000" dirty="0">
+                <a:solidFill>
+                  <a:schemeClr val="tx1"/>
+                </a:solidFill>
+              </a:rPr>
+              <a:t>In module()</a:t>
+            </a:r>
+          </a:p>
+          <a:p>
+            <a:r>
+              <a:rPr lang="en-US" sz="2000" dirty="0">
+                <a:solidFill>
+                  <a:schemeClr val="tx1"/>
+                </a:solidFill>
+              </a:rPr>
+              <a:t>result = </a:t>
+            </a:r>
+            <a:r>
+              <a:rPr lang="en-US" sz="2000" dirty="0" err="1">
+                <a:solidFill>
+                  <a:schemeClr val="tx1"/>
+                </a:solidFill>
+              </a:rPr>
+              <a:t>add_one</a:t>
+            </a:r>
+            <a:r>
+              <a:rPr lang="en-US" sz="2000" dirty="0">
+                <a:solidFill>
+                  <a:schemeClr val="tx1"/>
+                </a:solidFill>
+              </a:rPr>
+              <a:t>(x)</a:t>
+            </a:r>
+            <a:endParaRPr lang="en-US" sz="2000" dirty="0">
+              <a:solidFill>
+                <a:schemeClr val="tx1"/>
+              </a:solidFill>
+            </a:endParaRPr>
+          </a:p>
+        </p:txBody>
+      </p:sp>
+      <p:sp>
+        <p:nvSpPr>
+          <p:cNvPr id="12" name="Rectangle 11"/>
+          <p:cNvSpPr/>
+          <p:nvPr/>
+        </p:nvSpPr>
+        <p:spPr>
+          <a:xfrm>
+            <a:off x="777899" y="5907904"/>
+            <a:ext cx="3884531" cy="836597"/>
+          </a:xfrm>
+          <a:prstGeom prst="rect">
+            <a:avLst/>
+          </a:prstGeom>
+        </p:spPr>
+        <p:style>
+          <a:lnRef idx="1">
+            <a:schemeClr val="accent1"/>
+          </a:lnRef>
+          <a:fillRef idx="2">
+            <a:schemeClr val="accent1"/>
+          </a:fillRef>
+          <a:effectRef idx="1">
+            <a:schemeClr val="accent1"/>
+          </a:effectRef>
+          <a:fontRef idx="minor">
+            <a:schemeClr val="dk1"/>
+          </a:fontRef>
+        </p:style>
+        <p:txBody>
+          <a:bodyPr rtlCol="0" anchor="t"/>
+          <a:lstStyle/>
+          <a:p>
+            <a:r>
+              <a:rPr lang="en-US" sz="2000" dirty="0" smtClean="0"/>
+              <a:t>Global Name </a:t>
+            </a:r>
+            <a:r>
+              <a:rPr lang="en-US" sz="2000" dirty="0" smtClean="0"/>
+              <a:t>Space </a:t>
+            </a:r>
+          </a:p>
+        </p:txBody>
+      </p:sp>
+      <p:sp>
+        <p:nvSpPr>
+          <p:cNvPr id="13" name="Rectangle 12"/>
+          <p:cNvSpPr/>
+          <p:nvPr/>
+        </p:nvSpPr>
+        <p:spPr>
+          <a:xfrm>
+            <a:off x="1733541" y="6254837"/>
+            <a:ext cx="986624" cy="466175"/>
+          </a:xfrm>
+          <a:prstGeom prst="rect">
+            <a:avLst/>
+          </a:prstGeom>
+        </p:spPr>
+        <p:style>
+          <a:lnRef idx="2">
+            <a:schemeClr val="accent1"/>
+          </a:lnRef>
+          <a:fillRef idx="1">
+            <a:schemeClr val="lt1"/>
+          </a:fillRef>
+          <a:effectRef idx="0">
+            <a:schemeClr val="accent1"/>
+          </a:effectRef>
+          <a:fontRef idx="minor">
+            <a:schemeClr val="dk1"/>
+          </a:fontRef>
+        </p:style>
+        <p:txBody>
+          <a:bodyPr rtlCol="0" anchor="ctr"/>
+          <a:lstStyle/>
+          <a:p>
+            <a:pPr algn="ctr"/>
+            <a:r>
+              <a:rPr lang="en-US" sz="2000" dirty="0" smtClean="0"/>
+              <a:t>x</a:t>
+            </a:r>
+            <a:endParaRPr lang="en-US" sz="2000" dirty="0"/>
+          </a:p>
+        </p:txBody>
+      </p:sp>
+      <p:sp>
+        <p:nvSpPr>
+          <p:cNvPr id="14" name="Rectangle 13"/>
+          <p:cNvSpPr/>
+          <p:nvPr/>
+        </p:nvSpPr>
+        <p:spPr>
+          <a:xfrm>
+            <a:off x="457200" y="5255781"/>
+            <a:ext cx="4451639" cy="1626007"/>
+          </a:xfrm>
+          <a:prstGeom prst="rect">
+            <a:avLst/>
+          </a:prstGeom>
+          <a:noFill/>
+        </p:spPr>
+        <p:style>
+          <a:lnRef idx="1">
+            <a:schemeClr val="accent1"/>
+          </a:lnRef>
+          <a:fillRef idx="3">
+            <a:schemeClr val="accent1"/>
+          </a:fillRef>
+          <a:effectRef idx="2">
+            <a:schemeClr val="accent1"/>
+          </a:effectRef>
+          <a:fontRef idx="minor">
+            <a:schemeClr val="lt1"/>
+          </a:fontRef>
+        </p:style>
+        <p:txBody>
+          <a:bodyPr rtlCol="0" anchor="t"/>
+          <a:lstStyle/>
+          <a:p>
+            <a:r>
+              <a:rPr lang="en-US" sz="2000" dirty="0">
+                <a:solidFill>
+                  <a:schemeClr val="tx1"/>
+                </a:solidFill>
+              </a:rPr>
+              <a:t>In </a:t>
+            </a:r>
+            <a:r>
+              <a:rPr lang="en-US" sz="2000" dirty="0" err="1" smtClean="0">
+                <a:solidFill>
+                  <a:schemeClr val="tx1"/>
+                </a:solidFill>
+              </a:rPr>
+              <a:t>add_one</a:t>
+            </a:r>
+            <a:r>
+              <a:rPr lang="en-US" sz="2000" dirty="0" smtClean="0">
+                <a:solidFill>
+                  <a:schemeClr val="tx1"/>
+                </a:solidFill>
+              </a:rPr>
+              <a:t>()</a:t>
+            </a:r>
+          </a:p>
+          <a:p>
+            <a:r>
+              <a:rPr lang="fr-FR" sz="2000" dirty="0">
+                <a:solidFill>
+                  <a:srgbClr val="000000"/>
+                </a:solidFill>
+              </a:rPr>
+              <a:t>x = x + 1 </a:t>
+            </a:r>
+            <a:endParaRPr lang="en-US" sz="2000" dirty="0">
+              <a:solidFill>
+                <a:srgbClr val="000000"/>
+              </a:solidFill>
+            </a:endParaRPr>
+          </a:p>
+        </p:txBody>
+      </p:sp>
+      <p:cxnSp>
+        <p:nvCxnSpPr>
+          <p:cNvPr id="15" name="Straight Arrow Connector 14"/>
+          <p:cNvCxnSpPr>
+            <a:endCxn id="16" idx="1"/>
+          </p:cNvCxnSpPr>
+          <p:nvPr/>
+        </p:nvCxnSpPr>
+        <p:spPr>
+          <a:xfrm flipV="1">
+            <a:off x="2720165" y="5729940"/>
+            <a:ext cx="4135676" cy="734283"/>
+          </a:xfrm>
+          <a:prstGeom prst="straightConnector1">
+            <a:avLst/>
+          </a:prstGeom>
+          <a:ln w="101600">
+            <a:solidFill>
+              <a:srgbClr val="800000"/>
+            </a:solidFill>
+            <a:tailEnd type="triangle"/>
+          </a:ln>
+        </p:spPr>
+        <p:style>
+          <a:lnRef idx="2">
+            <a:schemeClr val="accent1"/>
+          </a:lnRef>
+          <a:fillRef idx="0">
+            <a:schemeClr val="accent1"/>
+          </a:fillRef>
+          <a:effectRef idx="1">
+            <a:schemeClr val="accent1"/>
+          </a:effectRef>
+          <a:fontRef idx="minor">
+            <a:schemeClr val="tx1"/>
+          </a:fontRef>
+        </p:style>
+      </p:cxnSp>
+      <p:sp>
+        <p:nvSpPr>
+          <p:cNvPr id="16" name="Rectangle 15"/>
+          <p:cNvSpPr/>
+          <p:nvPr/>
+        </p:nvSpPr>
+        <p:spPr>
+          <a:xfrm>
+            <a:off x="6855841" y="5496852"/>
+            <a:ext cx="546631" cy="466175"/>
+          </a:xfrm>
+          <a:prstGeom prst="rect">
+            <a:avLst/>
+          </a:prstGeom>
+        </p:spPr>
+        <p:style>
+          <a:lnRef idx="2">
+            <a:schemeClr val="accent1"/>
+          </a:lnRef>
+          <a:fillRef idx="1">
+            <a:schemeClr val="lt1"/>
+          </a:fillRef>
+          <a:effectRef idx="0">
+            <a:schemeClr val="accent1"/>
+          </a:effectRef>
+          <a:fontRef idx="minor">
+            <a:schemeClr val="dk1"/>
+          </a:fontRef>
+        </p:style>
+        <p:txBody>
+          <a:bodyPr rtlCol="0" anchor="ctr"/>
+          <a:lstStyle/>
+          <a:p>
+            <a:pPr algn="ctr"/>
+            <a:r>
+              <a:rPr lang="en-US" sz="2000" dirty="0"/>
+              <a:t>4</a:t>
+            </a:r>
+          </a:p>
+        </p:txBody>
+      </p:sp>
+      <p:sp>
+        <p:nvSpPr>
+          <p:cNvPr id="17" name="TextBox 16"/>
+          <p:cNvSpPr txBox="1"/>
+          <p:nvPr/>
+        </p:nvSpPr>
+        <p:spPr>
+          <a:xfrm>
+            <a:off x="7273853" y="5981991"/>
+            <a:ext cx="441146" cy="369332"/>
+          </a:xfrm>
+          <a:prstGeom prst="rect">
+            <a:avLst/>
+          </a:prstGeom>
+          <a:noFill/>
+        </p:spPr>
+        <p:txBody>
+          <a:bodyPr wrap="none" rtlCol="0">
+            <a:spAutoFit/>
+          </a:bodyPr>
+          <a:lstStyle/>
+          <a:p>
+            <a:r>
+              <a:rPr lang="en-US" dirty="0" err="1" smtClean="0"/>
+              <a:t>int</a:t>
+            </a:r>
+            <a:endParaRPr lang="en-US" dirty="0"/>
+          </a:p>
+        </p:txBody>
+      </p:sp>
+      <p:cxnSp>
+        <p:nvCxnSpPr>
+          <p:cNvPr id="20" name="Elbow Connector 19"/>
+          <p:cNvCxnSpPr>
+            <a:stCxn id="16" idx="2"/>
+            <a:endCxn id="17" idx="1"/>
+          </p:cNvCxnSpPr>
+          <p:nvPr/>
+        </p:nvCxnSpPr>
+        <p:spPr>
+          <a:xfrm rot="16200000" flipH="1">
+            <a:off x="7099690" y="5992494"/>
+            <a:ext cx="203630" cy="144696"/>
+          </a:xfrm>
+          <a:prstGeom prst="bentConnector2">
+            <a:avLst/>
+          </a:prstGeom>
+        </p:spPr>
+        <p:style>
+          <a:lnRef idx="2">
+            <a:schemeClr val="accent1"/>
+          </a:lnRef>
+          <a:fillRef idx="0">
+            <a:schemeClr val="accent1"/>
+          </a:fillRef>
+          <a:effectRef idx="1">
+            <a:schemeClr val="accent1"/>
+          </a:effectRef>
+          <a:fontRef idx="minor">
+            <a:schemeClr val="tx1"/>
+          </a:fontRef>
+        </p:style>
+      </p:cxnSp>
+    </p:spTree>
+    <p:extLst>
+      <p:ext uri="{BB962C8B-B14F-4D97-AF65-F5344CB8AC3E}">
+        <p14:creationId xmlns:p14="http://schemas.microsoft.com/office/powerpoint/2010/main" val="3901649761"/>
+      </p:ext>
+    </p:extLst>
+  </p:cSld>
+  <p:clrMapOvr>
+    <a:masterClrMapping/>
+  </p:clrMapOvr>
+</p:sld>
+</file>
+
+<file path=ppt/slides/slide18.xml><?xml version="1.0" encoding="utf-8"?>
+<p:sld xmlns:a="http://schemas.openxmlformats.org/drawingml/2006/main" xmlns:r="http://schemas.openxmlformats.org/officeDocument/2006/relationships" xmlns:p="http://schemas.openxmlformats.org/presentationml/2006/main">
+  <p:cSld>
+    <p:spTree>
+      <p:nvGrpSpPr>
+        <p:cNvPr id="1" name=""/>
+        <p:cNvGrpSpPr/>
+        <p:nvPr/>
+      </p:nvGrpSpPr>
+      <p:grpSpPr>
+        <a:xfrm>
+          <a:off x="0" y="0"/>
+          <a:ext cx="0" cy="0"/>
+          <a:chOff x="0" y="0"/>
+          <a:chExt cx="0" cy="0"/>
+        </a:xfrm>
+      </p:grpSpPr>
+      <p:sp>
+        <p:nvSpPr>
+          <p:cNvPr id="2" name="Title 1"/>
+          <p:cNvSpPr>
+            <a:spLocks noGrp="1"/>
+          </p:cNvSpPr>
+          <p:nvPr>
+            <p:ph type="title"/>
+          </p:nvPr>
+        </p:nvSpPr>
+        <p:spPr/>
+        <p:txBody>
+          <a:bodyPr>
+            <a:normAutofit fontScale="90000"/>
+          </a:bodyPr>
+          <a:lstStyle/>
+          <a:p>
+            <a:r>
+              <a:rPr lang="en-US" dirty="0" smtClean="0"/>
+              <a:t>Why </a:t>
+            </a:r>
+            <a:r>
+              <a:rPr lang="en-US" dirty="0" smtClean="0"/>
+              <a:t>Does Each Function get a </a:t>
+            </a:r>
+            <a:r>
+              <a:rPr lang="en-US" dirty="0" smtClean="0"/>
+              <a:t>Namespace?</a:t>
+            </a:r>
+            <a:endParaRPr lang="en-US" dirty="0"/>
+          </a:p>
+        </p:txBody>
+      </p:sp>
+      <p:sp>
+        <p:nvSpPr>
+          <p:cNvPr id="3" name="Content Placeholder 2"/>
+          <p:cNvSpPr>
+            <a:spLocks noGrp="1"/>
+          </p:cNvSpPr>
+          <p:nvPr>
+            <p:ph idx="1"/>
+          </p:nvPr>
+        </p:nvSpPr>
+        <p:spPr/>
+        <p:txBody>
+          <a:bodyPr>
+            <a:normAutofit fontScale="92500" lnSpcReduction="10000"/>
+          </a:bodyPr>
+          <a:lstStyle/>
+          <a:p>
+            <a:pPr marL="514350" indent="-514350">
+              <a:buFont typeface="+mj-lt"/>
+              <a:buAutoNum type="arabicPeriod"/>
+            </a:pPr>
+            <a:r>
+              <a:rPr lang="en-US" dirty="0" smtClean="0"/>
+              <a:t>It </a:t>
+            </a:r>
+            <a:r>
+              <a:rPr lang="en-US" dirty="0"/>
+              <a:t>prevents a function from accidentally altering variables in other parts of the program.</a:t>
+            </a:r>
+          </a:p>
+          <a:p>
+            <a:pPr marL="514350" indent="-514350">
+              <a:buFont typeface="+mj-lt"/>
+              <a:buAutoNum type="arabicPeriod"/>
+            </a:pPr>
+            <a:r>
+              <a:rPr lang="en-US" dirty="0" smtClean="0"/>
+              <a:t>Different </a:t>
+            </a:r>
+            <a:r>
+              <a:rPr lang="en-US" dirty="0"/>
+              <a:t>functions may be written by different programmers.  It would be a huge pain to make sure they use different names.</a:t>
+            </a:r>
+          </a:p>
+          <a:p>
+            <a:pPr marL="514350" indent="-514350">
+              <a:buFont typeface="+mj-lt"/>
+              <a:buAutoNum type="arabicPeriod"/>
+            </a:pPr>
+            <a:r>
+              <a:rPr lang="en-US" dirty="0" smtClean="0"/>
+              <a:t>In </a:t>
+            </a:r>
+            <a:r>
+              <a:rPr lang="en-US" dirty="0"/>
+              <a:t>large programs, we won’t run out of nice short variable names, since they can be reused.</a:t>
+            </a:r>
+          </a:p>
+          <a:p>
+            <a:pPr marL="514350" indent="-514350">
+              <a:buFont typeface="+mj-lt"/>
+              <a:buAutoNum type="arabicPeriod"/>
+            </a:pPr>
+            <a:r>
+              <a:rPr lang="en-US" dirty="0" smtClean="0"/>
+              <a:t>The </a:t>
+            </a:r>
+            <a:r>
+              <a:rPr lang="en-US" dirty="0"/>
+              <a:t>effects of a function are limited to the parameters it takes, making it easier to understand.</a:t>
+            </a:r>
+            <a:endParaRPr lang="en-US" dirty="0" smtClean="0"/>
+          </a:p>
+        </p:txBody>
+      </p:sp>
+    </p:spTree>
+    <p:extLst>
+      <p:ext uri="{BB962C8B-B14F-4D97-AF65-F5344CB8AC3E}">
+        <p14:creationId xmlns:p14="http://schemas.microsoft.com/office/powerpoint/2010/main" val="2865552930"/>
       </p:ext>
     </p:extLst>
   </p:cSld>
@@ -5152,12 +7385,12 @@
       </p:grpSpPr>
       <p:sp>
         <p:nvSpPr>
-          <p:cNvPr id="4" name="Title 3"/>
-          <p:cNvSpPr>
-            <a:spLocks noGrp="1"/>
-          </p:cNvSpPr>
-          <p:nvPr>
-            <p:ph type="ctrTitle"/>
+          <p:cNvPr id="2" name="Title 1"/>
+          <p:cNvSpPr>
+            <a:spLocks noGrp="1"/>
+          </p:cNvSpPr>
+          <p:nvPr>
+            <p:ph type="title"/>
           </p:nvPr>
         </p:nvSpPr>
         <p:spPr/>
@@ -5167,7 +7400,7 @@
           <a:p>
             <a:r>
               <a:rPr lang="en-US" dirty="0" smtClean="0"/>
-              <a:t>Functions and the Call Stack</a:t>
+              <a:t>A Note on Terminology</a:t>
             </a:r>
             <a:endParaRPr lang="en-US" dirty="0"/>
           </a:p>
@@ -5175,27 +7408,164 @@
       </p:sp>
       <p:sp>
         <p:nvSpPr>
-          <p:cNvPr id="5" name="Subtitle 4"/>
-          <p:cNvSpPr>
-            <a:spLocks noGrp="1"/>
-          </p:cNvSpPr>
-          <p:nvPr>
-            <p:ph type="subTitle" idx="1"/>
-          </p:nvPr>
-        </p:nvSpPr>
-        <p:spPr/>
-        <p:txBody>
-          <a:bodyPr/>
-          <a:lstStyle/>
-          <a:p>
-            <a:endParaRPr lang="en-US"/>
-          </a:p>
-        </p:txBody>
-      </p:sp>
+          <p:cNvPr id="3" name="Content Placeholder 2"/>
+          <p:cNvSpPr>
+            <a:spLocks noGrp="1"/>
+          </p:cNvSpPr>
+          <p:nvPr>
+            <p:ph idx="1"/>
+          </p:nvPr>
+        </p:nvSpPr>
+        <p:spPr>
+          <a:xfrm>
+            <a:off x="457200" y="4410400"/>
+            <a:ext cx="8229600" cy="2042169"/>
+          </a:xfrm>
+        </p:spPr>
+        <p:txBody>
+          <a:bodyPr>
+            <a:normAutofit fontScale="62500" lnSpcReduction="20000"/>
+          </a:bodyPr>
+          <a:lstStyle/>
+          <a:p>
+            <a:r>
+              <a:rPr lang="en-US" dirty="0" smtClean="0"/>
+              <a:t>Note that there’s a difference between parameters and arguments.</a:t>
+            </a:r>
+          </a:p>
+          <a:p>
+            <a:r>
+              <a:rPr lang="en-US" dirty="0" smtClean="0"/>
+              <a:t>When we’re inside a function, we call the values passed in Parameters</a:t>
+            </a:r>
+          </a:p>
+          <a:p>
+            <a:r>
+              <a:rPr lang="en-US" dirty="0" smtClean="0"/>
+              <a:t>But when we call a function from the outside, we call the values we pass in arguments.</a:t>
+            </a:r>
+          </a:p>
+          <a:p>
+            <a:r>
+              <a:rPr lang="en-US" dirty="0" smtClean="0"/>
+              <a:t>People will understand you if you get these mixed up, but keep in mind that there is this difference.</a:t>
+            </a:r>
+            <a:endParaRPr lang="en-US" dirty="0"/>
+          </a:p>
+        </p:txBody>
+      </p:sp>
+      <p:pic>
+        <p:nvPicPr>
+          <p:cNvPr id="4" name="Picture 3" descr="Screen Shot 2015-07-31 at 2.37.39 PM.png"/>
+          <p:cNvPicPr>
+            <a:picLocks noChangeAspect="1"/>
+          </p:cNvPicPr>
+          <p:nvPr/>
+        </p:nvPicPr>
+        <p:blipFill>
+          <a:blip r:embed="rId2">
+            <a:extLst>
+              <a:ext uri="{28A0092B-C50C-407E-A947-70E740481C1C}">
+                <a14:useLocalDpi xmlns:a14="http://schemas.microsoft.com/office/drawing/2010/main" val="0"/>
+              </a:ext>
+            </a:extLst>
+          </a:blip>
+          <a:stretch>
+            <a:fillRect/>
+          </a:stretch>
+        </p:blipFill>
+        <p:spPr>
+          <a:xfrm>
+            <a:off x="1197614" y="1554024"/>
+            <a:ext cx="5740400" cy="2692400"/>
+          </a:xfrm>
+          <a:prstGeom prst="rect">
+            <a:avLst/>
+          </a:prstGeom>
+        </p:spPr>
+      </p:pic>
+      <p:cxnSp>
+        <p:nvCxnSpPr>
+          <p:cNvPr id="6" name="Curved Connector 5"/>
+          <p:cNvCxnSpPr/>
+          <p:nvPr/>
+        </p:nvCxnSpPr>
+        <p:spPr>
+          <a:xfrm rot="10800000">
+            <a:off x="3535737" y="1698948"/>
+            <a:ext cx="3930504" cy="12700"/>
+          </a:xfrm>
+          <a:prstGeom prst="curvedConnector3">
+            <a:avLst>
+              <a:gd name="adj1" fmla="val 50000"/>
+            </a:avLst>
+          </a:prstGeom>
+          <a:ln w="60325">
+            <a:solidFill>
+              <a:schemeClr val="accent2"/>
+            </a:solidFill>
+            <a:headEnd type="none"/>
+            <a:tailEnd type="arrow"/>
+          </a:ln>
+        </p:spPr>
+        <p:style>
+          <a:lnRef idx="2">
+            <a:schemeClr val="accent1"/>
+          </a:lnRef>
+          <a:fillRef idx="0">
+            <a:schemeClr val="accent1"/>
+          </a:fillRef>
+          <a:effectRef idx="1">
+            <a:schemeClr val="accent1"/>
+          </a:effectRef>
+          <a:fontRef idx="minor">
+            <a:schemeClr val="tx1"/>
+          </a:fontRef>
+        </p:style>
+      </p:cxnSp>
+      <p:cxnSp>
+        <p:nvCxnSpPr>
+          <p:cNvPr id="8" name="Curved Connector 7"/>
+          <p:cNvCxnSpPr/>
+          <p:nvPr/>
+        </p:nvCxnSpPr>
+        <p:spPr>
+          <a:xfrm rot="10800000">
+            <a:off x="3688137" y="3807713"/>
+            <a:ext cx="3930504" cy="12700"/>
+          </a:xfrm>
+          <a:prstGeom prst="curvedConnector3">
+            <a:avLst>
+              <a:gd name="adj1" fmla="val 50000"/>
+            </a:avLst>
+          </a:prstGeom>
+          <a:ln w="60325">
+            <a:solidFill>
+              <a:schemeClr val="accent2"/>
+            </a:solidFill>
+            <a:headEnd type="none"/>
+            <a:tailEnd type="arrow"/>
+          </a:ln>
+        </p:spPr>
+        <p:style>
+          <a:lnRef idx="2">
+            <a:schemeClr val="accent1"/>
+          </a:lnRef>
+          <a:fillRef idx="0">
+            <a:schemeClr val="accent1"/>
+          </a:fillRef>
+          <a:effectRef idx="1">
+            <a:schemeClr val="accent1"/>
+          </a:effectRef>
+          <a:fontRef idx="minor">
+            <a:schemeClr val="tx1"/>
+          </a:fontRef>
+        </p:style>
+      </p:cxnSp>
     </p:spTree>
     <p:extLst>
       <p:ext uri="{BB962C8B-B14F-4D97-AF65-F5344CB8AC3E}">
-        <p14:creationId xmlns:p14="http://schemas.microsoft.com/office/powerpoint/2010/main" val="2031983207"/>
+        <p14:creationId xmlns:p14="http://schemas.microsoft.com/office/powerpoint/2010/main" val="1127312629"/>
       </p:ext>
     </p:extLst>
   </p:cSld>
@@ -5224,12 +7594,12 @@
       </p:grpSpPr>
       <p:sp>
         <p:nvSpPr>
-          <p:cNvPr id="2" name="Title 1"/>
-          <p:cNvSpPr>
-            <a:spLocks noGrp="1"/>
-          </p:cNvSpPr>
-          <p:nvPr>
-            <p:ph type="title"/>
+          <p:cNvPr id="4" name="Title 3"/>
+          <p:cNvSpPr>
+            <a:spLocks noGrp="1"/>
+          </p:cNvSpPr>
+          <p:nvPr>
+            <p:ph type="ctrTitle"/>
           </p:nvPr>
         </p:nvSpPr>
         <p:spPr/>
@@ -5239,7 +7609,7 @@
           <a:p>
             <a:r>
               <a:rPr lang="en-US" dirty="0" smtClean="0"/>
-              <a:t>Call Stack</a:t>
+              <a:t>Functions and the Call Stack</a:t>
             </a:r>
             <a:endParaRPr lang="en-US" dirty="0"/>
           </a:p>
@@ -5247,165 +7617,33 @@
       </p:sp>
       <p:sp>
         <p:nvSpPr>
-          <p:cNvPr id="3" name="Content Placeholder 2"/>
-          <p:cNvSpPr>
-            <a:spLocks noGrp="1"/>
-          </p:cNvSpPr>
-          <p:nvPr>
-            <p:ph idx="1"/>
-          </p:nvPr>
-        </p:nvSpPr>
-        <p:spPr>
-          <a:xfrm>
-            <a:off x="457199" y="1600201"/>
-            <a:ext cx="4646975" cy="5075462"/>
-          </a:xfrm>
-        </p:spPr>
-        <p:txBody>
-          <a:bodyPr>
-            <a:normAutofit fontScale="55000" lnSpcReduction="20000"/>
-          </a:bodyPr>
-          <a:lstStyle/>
-          <a:p>
-            <a:r>
-              <a:rPr lang="en-US" dirty="0" smtClean="0"/>
-              <a:t>How does Python keep track of where control needs to go when you call functions?</a:t>
-            </a:r>
-          </a:p>
-          <a:p>
-            <a:r>
-              <a:rPr lang="en-US" dirty="0" smtClean="0"/>
-              <a:t>We already know that python always remembers the point in the program where control currently is.</a:t>
-            </a:r>
-          </a:p>
-          <a:p>
-            <a:r>
-              <a:rPr lang="en-US" dirty="0" smtClean="0"/>
-              <a:t>But that’s not enough, if control is inside a function, Python has to remember the point where the function was called, so control can go back there.</a:t>
-            </a:r>
-          </a:p>
-          <a:p>
-            <a:r>
-              <a:rPr lang="en-US" dirty="0" smtClean="0"/>
-              <a:t>And if the function was called inside another function, Python has to remember where that function was called from, and so forth.</a:t>
-            </a:r>
-          </a:p>
-          <a:p>
-            <a:r>
-              <a:rPr lang="en-US" dirty="0" smtClean="0"/>
-              <a:t>It does this with the help of a special data structure called an execution stack, or call stack.</a:t>
-            </a:r>
-          </a:p>
-          <a:p>
-            <a:r>
-              <a:rPr lang="en-US" dirty="0" smtClean="0"/>
-              <a:t>Think about the execution like a stack of plates, one on top of another.  Each plate remember one place in the program where we are executing statements.</a:t>
-            </a:r>
-            <a:endParaRPr lang="en-US" dirty="0"/>
-          </a:p>
-        </p:txBody>
-      </p:sp>
-      <p:sp>
-        <p:nvSpPr>
-          <p:cNvPr id="4" name="Rectangle 3"/>
-          <p:cNvSpPr/>
-          <p:nvPr/>
-        </p:nvSpPr>
-        <p:spPr>
-          <a:xfrm>
-            <a:off x="5221785" y="1975925"/>
-            <a:ext cx="3316538" cy="751450"/>
-          </a:xfrm>
-          <a:prstGeom prst="rect">
-            <a:avLst/>
-          </a:prstGeom>
-        </p:spPr>
-        <p:style>
-          <a:lnRef idx="2">
-            <a:schemeClr val="accent1"/>
-          </a:lnRef>
-          <a:fillRef idx="1">
-            <a:schemeClr val="lt1"/>
-          </a:fillRef>
-          <a:effectRef idx="0">
-            <a:schemeClr val="accent1"/>
-          </a:effectRef>
-          <a:fontRef idx="minor">
-            <a:schemeClr val="dk1"/>
-          </a:fontRef>
-        </p:style>
-        <p:txBody>
-          <a:bodyPr rtlCol="0" anchor="ctr"/>
-          <a:lstStyle/>
-          <a:p>
-            <a:pPr algn="ctr"/>
-            <a:r>
-              <a:rPr lang="en-US" sz="2800" dirty="0" smtClean="0"/>
-              <a:t>In Main at line 25</a:t>
-            </a:r>
-            <a:endParaRPr lang="en-US" sz="2800" dirty="0"/>
-          </a:p>
-        </p:txBody>
-      </p:sp>
-      <p:sp>
-        <p:nvSpPr>
-          <p:cNvPr id="5" name="Rectangle 4"/>
-          <p:cNvSpPr/>
-          <p:nvPr/>
-        </p:nvSpPr>
-        <p:spPr>
-          <a:xfrm>
-            <a:off x="5221785" y="2750515"/>
-            <a:ext cx="3316538" cy="941575"/>
-          </a:xfrm>
-          <a:prstGeom prst="rect">
-            <a:avLst/>
-          </a:prstGeom>
-        </p:spPr>
-        <p:style>
-          <a:lnRef idx="2">
-            <a:schemeClr val="accent1"/>
-          </a:lnRef>
-          <a:fillRef idx="1">
-            <a:schemeClr val="lt1"/>
-          </a:fillRef>
-          <a:effectRef idx="0">
-            <a:schemeClr val="accent1"/>
-          </a:effectRef>
-          <a:fontRef idx="minor">
-            <a:schemeClr val="dk1"/>
-          </a:fontRef>
-        </p:style>
-        <p:txBody>
-          <a:bodyPr rtlCol="0" anchor="ctr"/>
-          <a:lstStyle/>
-          <a:p>
-            <a:pPr algn="ctr"/>
-            <a:r>
-              <a:rPr lang="en-US" sz="2800" dirty="0" smtClean="0"/>
-              <a:t>In geometric _mean at line 12</a:t>
-            </a:r>
-            <a:endParaRPr lang="en-US" sz="2800" dirty="0"/>
+          <p:cNvPr id="5" name="Subtitle 4"/>
+          <p:cNvSpPr>
+            <a:spLocks noGrp="1"/>
+          </p:cNvSpPr>
+          <p:nvPr>
+            <p:ph type="subTitle" idx="1"/>
+          </p:nvPr>
+        </p:nvSpPr>
+        <p:spPr/>
+        <p:txBody>
+          <a:bodyPr/>
+          <a:lstStyle/>
+          <a:p>
+            <a:endParaRPr lang="en-US"/>
           </a:p>
         </p:txBody>
       </p:sp>
     </p:spTree>
     <p:extLst>
       <p:ext uri="{BB962C8B-B14F-4D97-AF65-F5344CB8AC3E}">
-        <p14:creationId xmlns:p14="http://schemas.microsoft.com/office/powerpoint/2010/main" val="2380945954"/>
+        <p14:creationId xmlns:p14="http://schemas.microsoft.com/office/powerpoint/2010/main" val="2031983207"/>
       </p:ext>
     </p:extLst>
   </p:cSld>
   <p:clrMapOvr>
     <a:masterClrMapping/>
   </p:clrMapOvr>
-  <p:timing>
-    <p:tnLst>
-      <p:par>
-        <p:cTn xmlns:p14="http://schemas.microsoft.com/office/powerpoint/2010/main" id="1" dur="indefinite" restart="never" nodeType="tmRoot"/>
-      </p:par>
-    </p:tnLst>
-  </p:timing>
 </p:sld>
 </file>
 
@@ -5462,96 +7700,49 @@
         <p:spPr>
           <a:xfrm>
             <a:off x="457199" y="1600201"/>
-            <a:ext cx="4646975" cy="3738046"/>
+            <a:ext cx="4646975" cy="5075462"/>
           </a:xfrm>
         </p:spPr>
         <p:txBody>
           <a:bodyPr>
-            <a:normAutofit fontScale="62500" lnSpcReduction="20000"/>
+            <a:normAutofit fontScale="55000" lnSpcReduction="20000"/>
           </a:bodyPr>
           <a:lstStyle/>
           <a:p>
             <a:r>
               <a:rPr lang="en-US" dirty="0" smtClean="0"/>
-              <a:t>When you start a program, there’s only one stack frame – the one that tells us where we’re executing the main script.</a:t>
-            </a:r>
-            <a:endParaRPr lang="en-US" dirty="0" smtClean="0"/>
+              <a:t>How does Python keep track of where control needs to go when you call functions?</a:t>
+            </a:r>
           </a:p>
           <a:p>
             <a:r>
               <a:rPr lang="en-US" dirty="0" smtClean="0"/>
-              <a:t>Let’s say that </a:t>
-            </a:r>
+              <a:t>We already know that python always remembers the point in the program where control currently is.</a:t>
+            </a:r>
+          </a:p>
+          <a:p>
             <a:r>
               <a:rPr lang="en-US" dirty="0" smtClean="0"/>
-              <a:t>we call a function, like </a:t>
-            </a:r>
-            <a:r>
-              <a:rPr lang="en-US" dirty="0" err="1" smtClean="0"/>
-              <a:t>sqrt</a:t>
-            </a:r>
+              <a:t>But that’s not enough, if control is inside a function, Python has to remember the point where the function was called, so control can go back there.</a:t>
+            </a:r>
+          </a:p>
+          <a:p>
             <a:r>
               <a:rPr lang="en-US" dirty="0" smtClean="0"/>
-              <a:t>.</a:t>
+              <a:t>And if the function was called inside another function, Python has to remember where that function was called from, and so forth.</a:t>
             </a:r>
           </a:p>
           <a:p>
             <a:r>
               <a:rPr lang="en-US" dirty="0" smtClean="0"/>
-              <a:t>This pushes </a:t>
-            </a:r>
+              <a:t>It does this with the help of a special data structure called an execution stack, or call stack.</a:t>
+            </a:r>
+          </a:p>
+          <a:p>
             <a:r>
               <a:rPr lang="en-US" dirty="0" smtClean="0"/>
-              <a:t>a new frame onto the </a:t>
-            </a:r>
-            <a:r>
-              <a:rPr lang="en-US" dirty="0" smtClean="0"/>
-              <a:t>stack, that remembers where we are executin</a:t>
-            </a:r>
-            <a:r>
-              <a:rPr lang="en-US" dirty="0" smtClean="0"/>
-              <a:t>g inside the </a:t>
-            </a:r>
-            <a:r>
-              <a:rPr lang="en-US" dirty="0" err="1" smtClean="0"/>
-              <a:t>sqrt</a:t>
-            </a:r>
-            <a:r>
-              <a:rPr lang="en-US" dirty="0" smtClean="0"/>
-              <a:t> function.</a:t>
-            </a:r>
-            <a:endParaRPr lang="en-US" dirty="0" smtClean="0"/>
-          </a:p>
-          <a:p>
-            <a:r>
-              <a:rPr lang="en-US" dirty="0" smtClean="0"/>
-              <a:t>When we hit the return statement, this </a:t>
-            </a:r>
-            <a:r>
-              <a:rPr lang="en-US" dirty="0" smtClean="0"/>
-              <a:t>pops the last frame off the </a:t>
-            </a:r>
-            <a:r>
-              <a:rPr lang="en-US" dirty="0" smtClean="0"/>
-              <a:t>stack.</a:t>
-            </a:r>
-          </a:p>
-          <a:p>
-            <a:r>
-              <a:rPr lang="en-US" dirty="0" smtClean="0"/>
-              <a:t>The frame underneath tells us where we called </a:t>
-            </a:r>
-            <a:r>
-              <a:rPr lang="en-US" dirty="0" err="1" smtClean="0"/>
-              <a:t>sqrt</a:t>
-            </a:r>
-            <a:r>
-              <a:rPr lang="en-US" dirty="0" smtClean="0"/>
-              <a:t> from, so control returns there.</a:t>
-            </a:r>
-            <a:endParaRPr lang="en-US" dirty="0" smtClean="0"/>
-          </a:p>
-          <a:p>
+              <a:t>Think about the execution like a stack of plates, one on top of another.  Each plate remember one place in the program where we are executing statements.</a:t>
+            </a:r>
             <a:endParaRPr lang="en-US" dirty="0"/>
           </a:p>
         </p:txBody>
@@ -5640,202 +7831,10 @@
           </a:p>
         </p:txBody>
       </p:sp>
-      <p:sp>
-        <p:nvSpPr>
-          <p:cNvPr id="6" name="Rectangle 5"/>
-          <p:cNvSpPr/>
-          <p:nvPr/>
-        </p:nvSpPr>
-        <p:spPr>
-          <a:xfrm>
-            <a:off x="1787637" y="5373178"/>
-            <a:ext cx="3316538" cy="941575"/>
-          </a:xfrm>
-          <a:prstGeom prst="rect">
-            <a:avLst/>
-          </a:prstGeom>
-        </p:spPr>
-        <p:style>
-          <a:lnRef idx="2">
-            <a:schemeClr val="accent1"/>
-          </a:lnRef>
-          <a:fillRef idx="1">
-            <a:schemeClr val="lt1"/>
-          </a:fillRef>
-          <a:effectRef idx="0">
-            <a:schemeClr val="accent1"/>
-          </a:effectRef>
-          <a:fontRef idx="minor">
-            <a:schemeClr val="dk1"/>
-          </a:fontRef>
-        </p:style>
-        <p:txBody>
-          <a:bodyPr rtlCol="0" anchor="ctr"/>
-          <a:lstStyle/>
-          <a:p>
-            <a:pPr algn="ctr"/>
-            <a:r>
-              <a:rPr lang="en-US" sz="2800" dirty="0" smtClean="0"/>
-              <a:t>In </a:t>
-            </a:r>
-            <a:r>
-              <a:rPr lang="en-US" sz="2800" dirty="0" err="1" smtClean="0"/>
-              <a:t>sqrt</a:t>
-            </a:r>
-            <a:r>
-              <a:rPr lang="en-US" sz="2800" dirty="0" smtClean="0"/>
-              <a:t> at line 8</a:t>
-            </a:r>
-            <a:endParaRPr lang="en-US" sz="2800" dirty="0"/>
-          </a:p>
-        </p:txBody>
-      </p:sp>
-      <p:cxnSp>
-        <p:nvCxnSpPr>
-          <p:cNvPr id="9" name="Curved Connector 8"/>
-          <p:cNvCxnSpPr>
-            <a:stCxn id="6" idx="3"/>
-          </p:cNvCxnSpPr>
-          <p:nvPr/>
-        </p:nvCxnSpPr>
-        <p:spPr>
-          <a:xfrm flipV="1">
-            <a:off x="5104175" y="3692090"/>
-            <a:ext cx="1434814" cy="2151876"/>
-          </a:xfrm>
-          <a:prstGeom prst="curvedConnector2">
-            <a:avLst/>
-          </a:prstGeom>
-          <a:ln w="152400">
-            <a:tailEnd type="triangle" w="med" len="med"/>
-          </a:ln>
-        </p:spPr>
-        <p:style>
-          <a:lnRef idx="2">
-            <a:schemeClr val="accent1"/>
-          </a:lnRef>
-          <a:fillRef idx="0">
-            <a:schemeClr val="accent1"/>
-          </a:fillRef>
-          <a:effectRef idx="1">
-            <a:schemeClr val="accent1"/>
-          </a:effectRef>
-          <a:fontRef idx="minor">
-            <a:schemeClr val="tx1"/>
-          </a:fontRef>
-        </p:style>
-      </p:cxnSp>
-      <p:sp>
-        <p:nvSpPr>
-          <p:cNvPr id="12" name="TextBox 11"/>
-          <p:cNvSpPr txBox="1"/>
-          <p:nvPr/>
-        </p:nvSpPr>
-        <p:spPr>
-          <a:xfrm>
-            <a:off x="5151218" y="4531955"/>
-            <a:ext cx="972767" cy="954107"/>
-          </a:xfrm>
-          <a:prstGeom prst="rect">
-            <a:avLst/>
-          </a:prstGeom>
-          <a:noFill/>
-        </p:spPr>
-        <p:txBody>
-          <a:bodyPr wrap="none" rtlCol="0">
-            <a:spAutoFit/>
-          </a:bodyPr>
-          <a:lstStyle/>
-          <a:p>
-            <a:r>
-              <a:rPr lang="en-US" sz="2800" dirty="0" smtClean="0"/>
-              <a:t>Enter</a:t>
-            </a:r>
-          </a:p>
-          <a:p>
-            <a:r>
-              <a:rPr lang="en-US" sz="2800" dirty="0" err="1" smtClean="0"/>
-              <a:t>sqrt</a:t>
-            </a:r>
-            <a:endParaRPr lang="en-US" sz="2800" dirty="0"/>
-          </a:p>
-        </p:txBody>
-      </p:sp>
-      <p:cxnSp>
-        <p:nvCxnSpPr>
-          <p:cNvPr id="13" name="Curved Connector 12"/>
-          <p:cNvCxnSpPr/>
-          <p:nvPr/>
-        </p:nvCxnSpPr>
-        <p:spPr>
-          <a:xfrm rot="16200000" flipH="1">
-            <a:off x="6748653" y="3905819"/>
-            <a:ext cx="2151874" cy="1724420"/>
-          </a:xfrm>
-          <a:prstGeom prst="curvedConnector3">
-            <a:avLst>
-              <a:gd name="adj1" fmla="val 100271"/>
-            </a:avLst>
-          </a:prstGeom>
-          <a:ln w="152400">
-            <a:tailEnd type="triangle" w="med" len="med"/>
-          </a:ln>
-        </p:spPr>
-        <p:style>
-          <a:lnRef idx="2">
-            <a:schemeClr val="accent1"/>
-          </a:lnRef>
-          <a:fillRef idx="0">
-            <a:schemeClr val="accent1"/>
-          </a:fillRef>
-          <a:effectRef idx="1">
-            <a:schemeClr val="accent1"/>
-          </a:effectRef>
-          <a:fontRef idx="minor">
-            <a:schemeClr val="tx1"/>
-          </a:fontRef>
-        </p:style>
-      </p:cxnSp>
-      <p:sp>
-        <p:nvSpPr>
-          <p:cNvPr id="20" name="TextBox 19"/>
-          <p:cNvSpPr txBox="1"/>
-          <p:nvPr/>
-        </p:nvSpPr>
-        <p:spPr>
-          <a:xfrm>
-            <a:off x="7393594" y="4536656"/>
-            <a:ext cx="1027119" cy="954107"/>
-          </a:xfrm>
-          <a:prstGeom prst="rect">
-            <a:avLst/>
-          </a:prstGeom>
-          <a:noFill/>
-        </p:spPr>
-        <p:txBody>
-          <a:bodyPr wrap="none" rtlCol="0">
-            <a:spAutoFit/>
-          </a:bodyPr>
-          <a:lstStyle/>
-          <a:p>
-            <a:r>
-              <a:rPr lang="en-US" sz="2800" dirty="0" smtClean="0"/>
-              <a:t>Leave</a:t>
-            </a:r>
-          </a:p>
-          <a:p>
-            <a:r>
-              <a:rPr lang="en-US" sz="2800" dirty="0" err="1" smtClean="0"/>
-              <a:t>sqrt</a:t>
-            </a:r>
-            <a:endParaRPr lang="en-US" sz="2800" dirty="0"/>
-          </a:p>
-        </p:txBody>
-      </p:sp>
     </p:spTree>
     <p:extLst>
       <p:ext uri="{BB962C8B-B14F-4D97-AF65-F5344CB8AC3E}">
-        <p14:creationId xmlns:p14="http://schemas.microsoft.com/office/powerpoint/2010/main" val="2794529890"/>
+        <p14:creationId xmlns:p14="http://schemas.microsoft.com/office/powerpoint/2010/main" val="2380945954"/>
       </p:ext>
     </p:extLst>
   </p:cSld>

</xml_diff>